<commit_message>
add final pres1 to the repo
</commit_message>
<xml_diff>
--- a/Documents/Presentations/Presentation1.pptx
+++ b/Documents/Presentations/Presentation1.pptx
@@ -8,16 +8,20 @@
     <p:sldId id="256" r:id="rId2"/>
     <p:sldId id="257" r:id="rId3"/>
     <p:sldId id="258" r:id="rId4"/>
-    <p:sldId id="259" r:id="rId5"/>
-    <p:sldId id="260" r:id="rId6"/>
-    <p:sldId id="261" r:id="rId7"/>
-    <p:sldId id="262" r:id="rId8"/>
-    <p:sldId id="269" r:id="rId9"/>
-    <p:sldId id="268" r:id="rId10"/>
-    <p:sldId id="267" r:id="rId11"/>
-    <p:sldId id="263" r:id="rId12"/>
-    <p:sldId id="264" r:id="rId13"/>
-    <p:sldId id="265" r:id="rId14"/>
+    <p:sldId id="270" r:id="rId5"/>
+    <p:sldId id="259" r:id="rId6"/>
+    <p:sldId id="260" r:id="rId7"/>
+    <p:sldId id="261" r:id="rId8"/>
+    <p:sldId id="262" r:id="rId9"/>
+    <p:sldId id="269" r:id="rId10"/>
+    <p:sldId id="268" r:id="rId11"/>
+    <p:sldId id="267" r:id="rId12"/>
+    <p:sldId id="275" r:id="rId13"/>
+    <p:sldId id="274" r:id="rId14"/>
+    <p:sldId id="271" r:id="rId15"/>
+    <p:sldId id="272" r:id="rId16"/>
+    <p:sldId id="265" r:id="rId17"/>
+    <p:sldId id="273" r:id="rId18"/>
   </p:sldIdLst>
   <p:sldSz cx="9144000" cy="6858000" type="screen4x3"/>
   <p:notesSz cx="6858000" cy="9144000"/>
@@ -305,7 +309,7 @@
           <a:p>
             <a:fld id="{4A88F55E-F3C8-451A-88F1-3CC070D1BD1A}" type="datetimeFigureOut">
               <a:rPr lang="en-US" smtClean="0"/>
-              <a:t>10/5/2016</a:t>
+              <a:t>10/10/2016</a:t>
             </a:fld>
             <a:endParaRPr lang="en-US"/>
           </a:p>
@@ -572,7 +576,7 @@
           <a:p>
             <a:fld id="{4A88F55E-F3C8-451A-88F1-3CC070D1BD1A}" type="datetimeFigureOut">
               <a:rPr lang="en-US" smtClean="0"/>
-              <a:t>10/5/2016</a:t>
+              <a:t>10/10/2016</a:t>
             </a:fld>
             <a:endParaRPr lang="en-US"/>
           </a:p>
@@ -803,7 +807,7 @@
           <a:p>
             <a:fld id="{4A88F55E-F3C8-451A-88F1-3CC070D1BD1A}" type="datetimeFigureOut">
               <a:rPr lang="en-US" smtClean="0"/>
-              <a:t>10/5/2016</a:t>
+              <a:t>10/10/2016</a:t>
             </a:fld>
             <a:endParaRPr lang="en-US"/>
           </a:p>
@@ -1113,7 +1117,7 @@
           <a:p>
             <a:fld id="{4A88F55E-F3C8-451A-88F1-3CC070D1BD1A}" type="datetimeFigureOut">
               <a:rPr lang="en-US" smtClean="0"/>
-              <a:t>10/5/2016</a:t>
+              <a:t>10/10/2016</a:t>
             </a:fld>
             <a:endParaRPr lang="en-US"/>
           </a:p>
@@ -1586,7 +1590,7 @@
           <a:p>
             <a:fld id="{4A88F55E-F3C8-451A-88F1-3CC070D1BD1A}" type="datetimeFigureOut">
               <a:rPr lang="en-US" smtClean="0"/>
-              <a:t>10/5/2016</a:t>
+              <a:t>10/10/2016</a:t>
             </a:fld>
             <a:endParaRPr lang="en-US"/>
           </a:p>
@@ -2133,7 +2137,7 @@
           <a:p>
             <a:fld id="{4A88F55E-F3C8-451A-88F1-3CC070D1BD1A}" type="datetimeFigureOut">
               <a:rPr lang="en-US" smtClean="0"/>
-              <a:t>10/5/2016</a:t>
+              <a:t>10/10/2016</a:t>
             </a:fld>
             <a:endParaRPr lang="en-US"/>
           </a:p>
@@ -2907,7 +2911,7 @@
           <a:p>
             <a:fld id="{4A88F55E-F3C8-451A-88F1-3CC070D1BD1A}" type="datetimeFigureOut">
               <a:rPr lang="en-US" smtClean="0"/>
-              <a:t>10/5/2016</a:t>
+              <a:t>10/10/2016</a:t>
             </a:fld>
             <a:endParaRPr lang="en-US"/>
           </a:p>
@@ -3082,7 +3086,7 @@
           <a:p>
             <a:fld id="{4A88F55E-F3C8-451A-88F1-3CC070D1BD1A}" type="datetimeFigureOut">
               <a:rPr lang="en-US" smtClean="0"/>
-              <a:t>10/5/2016</a:t>
+              <a:t>10/10/2016</a:t>
             </a:fld>
             <a:endParaRPr lang="en-US"/>
           </a:p>
@@ -3305,7 +3309,7 @@
           <a:p>
             <a:fld id="{4A88F55E-F3C8-451A-88F1-3CC070D1BD1A}" type="datetimeFigureOut">
               <a:rPr lang="en-US" smtClean="0"/>
-              <a:t>10/5/2016</a:t>
+              <a:t>10/10/2016</a:t>
             </a:fld>
             <a:endParaRPr lang="en-US"/>
           </a:p>
@@ -3485,7 +3489,7 @@
           <a:p>
             <a:fld id="{4A88F55E-F3C8-451A-88F1-3CC070D1BD1A}" type="datetimeFigureOut">
               <a:rPr lang="en-US" smtClean="0"/>
-              <a:t>10/5/2016</a:t>
+              <a:t>10/10/2016</a:t>
             </a:fld>
             <a:endParaRPr lang="en-US"/>
           </a:p>
@@ -3774,7 +3778,7 @@
           <a:p>
             <a:fld id="{4A88F55E-F3C8-451A-88F1-3CC070D1BD1A}" type="datetimeFigureOut">
               <a:rPr lang="en-US" smtClean="0"/>
-              <a:t>10/5/2016</a:t>
+              <a:t>10/10/2016</a:t>
             </a:fld>
             <a:endParaRPr lang="en-US"/>
           </a:p>
@@ -4016,7 +4020,7 @@
           <a:p>
             <a:fld id="{4A88F55E-F3C8-451A-88F1-3CC070D1BD1A}" type="datetimeFigureOut">
               <a:rPr lang="en-US" smtClean="0"/>
-              <a:t>10/5/2016</a:t>
+              <a:t>10/10/2016</a:t>
             </a:fld>
             <a:endParaRPr lang="en-US"/>
           </a:p>
@@ -4395,7 +4399,7 @@
           <a:p>
             <a:fld id="{4A88F55E-F3C8-451A-88F1-3CC070D1BD1A}" type="datetimeFigureOut">
               <a:rPr lang="en-US" smtClean="0"/>
-              <a:t>10/5/2016</a:t>
+              <a:t>10/10/2016</a:t>
             </a:fld>
             <a:endParaRPr lang="en-US"/>
           </a:p>
@@ -4513,7 +4517,7 @@
           <a:p>
             <a:fld id="{4A88F55E-F3C8-451A-88F1-3CC070D1BD1A}" type="datetimeFigureOut">
               <a:rPr lang="en-US" smtClean="0"/>
-              <a:t>10/5/2016</a:t>
+              <a:t>10/10/2016</a:t>
             </a:fld>
             <a:endParaRPr lang="en-US"/>
           </a:p>
@@ -4608,7 +4612,7 @@
           <a:p>
             <a:fld id="{4A88F55E-F3C8-451A-88F1-3CC070D1BD1A}" type="datetimeFigureOut">
               <a:rPr lang="en-US" smtClean="0"/>
-              <a:t>10/5/2016</a:t>
+              <a:t>10/10/2016</a:t>
             </a:fld>
             <a:endParaRPr lang="en-US"/>
           </a:p>
@@ -4857,7 +4861,7 @@
           <a:p>
             <a:fld id="{4A88F55E-F3C8-451A-88F1-3CC070D1BD1A}" type="datetimeFigureOut">
               <a:rPr lang="en-US" smtClean="0"/>
-              <a:t>10/5/2016</a:t>
+              <a:t>10/10/2016</a:t>
             </a:fld>
             <a:endParaRPr lang="en-US"/>
           </a:p>
@@ -5114,7 +5118,7 @@
           <a:p>
             <a:fld id="{4A88F55E-F3C8-451A-88F1-3CC070D1BD1A}" type="datetimeFigureOut">
               <a:rPr lang="en-US" smtClean="0"/>
-              <a:t>10/5/2016</a:t>
+              <a:t>10/10/2016</a:t>
             </a:fld>
             <a:endParaRPr lang="en-US"/>
           </a:p>
@@ -5357,7 +5361,7 @@
           <a:p>
             <a:fld id="{4A88F55E-F3C8-451A-88F1-3CC070D1BD1A}" type="datetimeFigureOut">
               <a:rPr lang="en-US" smtClean="0"/>
-              <a:t>10/5/2016</a:t>
+              <a:t>10/10/2016</a:t>
             </a:fld>
             <a:endParaRPr lang="en-US"/>
           </a:p>
@@ -5867,7 +5871,12 @@
             <p:ph type="title"/>
           </p:nvPr>
         </p:nvSpPr>
-        <p:spPr/>
+        <p:spPr>
+          <a:xfrm>
+            <a:off x="2171700" y="228600"/>
+            <a:ext cx="6377940" cy="1293028"/>
+          </a:xfrm>
+        </p:spPr>
         <p:txBody>
           <a:bodyPr/>
           <a:lstStyle/>
@@ -5894,18 +5903,48 @@
         </p:blipFill>
         <p:spPr>
           <a:xfrm>
-            <a:off x="1143000" y="1814512"/>
-            <a:ext cx="7010400" cy="4510088"/>
+            <a:off x="1295400" y="1371600"/>
+            <a:ext cx="6629400" cy="4650740"/>
           </a:xfrm>
           <a:prstGeom prst="rect">
             <a:avLst/>
           </a:prstGeom>
         </p:spPr>
       </p:pic>
+      <p:sp>
+        <p:nvSpPr>
+          <p:cNvPr id="6" name="TextBox 5"/>
+          <p:cNvSpPr txBox="1"/>
+          <p:nvPr/>
+        </p:nvSpPr>
+        <p:spPr>
+          <a:xfrm>
+            <a:off x="1219200" y="6248400"/>
+            <a:ext cx="7315200" cy="415498"/>
+          </a:xfrm>
+          <a:prstGeom prst="rect">
+            <a:avLst/>
+          </a:prstGeom>
+          <a:noFill/>
+        </p:spPr>
+        <p:txBody>
+          <a:bodyPr wrap="square" rtlCol="0">
+            <a:spAutoFit/>
+          </a:bodyPr>
+          <a:lstStyle/>
+          <a:p>
+            <a:r>
+              <a:rPr lang="en-US" sz="1050" dirty="0" smtClean="0"/>
+              <a:t>Note: These are our initial set of use cases. We may add new use cases as we progress and current use cases may change in the future.</a:t>
+            </a:r>
+            <a:endParaRPr lang="en-US" sz="1050" dirty="0"/>
+          </a:p>
+        </p:txBody>
+      </p:sp>
     </p:spTree>
     <p:extLst>
       <p:ext uri="{BB962C8B-B14F-4D97-AF65-F5344CB8AC3E}">
-        <p14:creationId xmlns:p14="http://schemas.microsoft.com/office/powerpoint/2010/main" val="1048500946"/>
+        <p14:creationId xmlns:p14="http://schemas.microsoft.com/office/powerpoint/2010/main" val="3424105124"/>
       </p:ext>
     </p:extLst>
   </p:cSld>
@@ -5942,6 +5981,280 @@
             <p:ph type="title"/>
           </p:nvPr>
         </p:nvSpPr>
+        <p:spPr>
+          <a:xfrm>
+            <a:off x="2171700" y="381000"/>
+            <a:ext cx="6377940" cy="1293028"/>
+          </a:xfrm>
+        </p:spPr>
+        <p:txBody>
+          <a:bodyPr/>
+          <a:lstStyle/>
+          <a:p>
+            <a:r>
+              <a:rPr lang="en-US" dirty="0" smtClean="0"/>
+              <a:t>Use Cases – Cont.</a:t>
+            </a:r>
+            <a:endParaRPr lang="en-US" dirty="0"/>
+          </a:p>
+        </p:txBody>
+      </p:sp>
+      <p:pic>
+        <p:nvPicPr>
+          <p:cNvPr id="4" name="Picture 3"/>
+          <p:cNvPicPr/>
+          <p:nvPr/>
+        </p:nvPicPr>
+        <p:blipFill>
+          <a:blip r:embed="rId2"/>
+          <a:stretch>
+            <a:fillRect/>
+          </a:stretch>
+        </p:blipFill>
+        <p:spPr>
+          <a:xfrm>
+            <a:off x="1143000" y="1447800"/>
+            <a:ext cx="7010400" cy="4510088"/>
+          </a:xfrm>
+          <a:prstGeom prst="rect">
+            <a:avLst/>
+          </a:prstGeom>
+        </p:spPr>
+      </p:pic>
+      <p:sp>
+        <p:nvSpPr>
+          <p:cNvPr id="6" name="TextBox 5"/>
+          <p:cNvSpPr txBox="1"/>
+          <p:nvPr/>
+        </p:nvSpPr>
+        <p:spPr>
+          <a:xfrm>
+            <a:off x="1219200" y="6248400"/>
+            <a:ext cx="7315200" cy="415498"/>
+          </a:xfrm>
+          <a:prstGeom prst="rect">
+            <a:avLst/>
+          </a:prstGeom>
+          <a:noFill/>
+        </p:spPr>
+        <p:txBody>
+          <a:bodyPr wrap="square" rtlCol="0">
+            <a:spAutoFit/>
+          </a:bodyPr>
+          <a:lstStyle/>
+          <a:p>
+            <a:r>
+              <a:rPr lang="en-US" sz="1050" dirty="0" smtClean="0"/>
+              <a:t>Note: These are our initial set of use cases. We may add new use cases as we progress and current use cases may change in the future.</a:t>
+            </a:r>
+            <a:endParaRPr lang="en-US" sz="1050" dirty="0"/>
+          </a:p>
+        </p:txBody>
+      </p:sp>
+    </p:spTree>
+    <p:extLst>
+      <p:ext uri="{BB962C8B-B14F-4D97-AF65-F5344CB8AC3E}">
+        <p14:creationId xmlns:p14="http://schemas.microsoft.com/office/powerpoint/2010/main" val="1048500946"/>
+      </p:ext>
+    </p:extLst>
+  </p:cSld>
+  <p:clrMapOvr>
+    <a:masterClrMapping/>
+  </p:clrMapOvr>
+</p:sld>
+</file>
+
+<file path=ppt/slides/slide12.xml><?xml version="1.0" encoding="utf-8"?>
+<p:sld xmlns:a="http://schemas.openxmlformats.org/drawingml/2006/main" xmlns:r="http://schemas.openxmlformats.org/officeDocument/2006/relationships" xmlns:p="http://schemas.openxmlformats.org/presentationml/2006/main">
+  <p:cSld>
+    <p:spTree>
+      <p:nvGrpSpPr>
+        <p:cNvPr id="1" name=""/>
+        <p:cNvGrpSpPr/>
+        <p:nvPr/>
+      </p:nvGrpSpPr>
+      <p:grpSpPr>
+        <a:xfrm>
+          <a:off x="0" y="0"/>
+          <a:ext cx="0" cy="0"/>
+          <a:chOff x="0" y="0"/>
+          <a:chExt cx="0" cy="0"/>
+        </a:xfrm>
+      </p:grpSpPr>
+      <p:sp>
+        <p:nvSpPr>
+          <p:cNvPr id="2" name="Title 1"/>
+          <p:cNvSpPr>
+            <a:spLocks noGrp="1"/>
+          </p:cNvSpPr>
+          <p:nvPr>
+            <p:ph type="title"/>
+          </p:nvPr>
+        </p:nvSpPr>
+        <p:spPr>
+          <a:xfrm>
+            <a:off x="457200" y="764373"/>
+            <a:ext cx="8092440" cy="1293028"/>
+          </a:xfrm>
+        </p:spPr>
+        <p:txBody>
+          <a:bodyPr/>
+          <a:lstStyle/>
+          <a:p>
+            <a:r>
+              <a:rPr lang="en-US" dirty="0" smtClean="0"/>
+              <a:t>Sequence diagrams </a:t>
+            </a:r>
+            <a:endParaRPr lang="en-US" dirty="0"/>
+          </a:p>
+        </p:txBody>
+      </p:sp>
+      <p:pic>
+        <p:nvPicPr>
+          <p:cNvPr id="4" name="Picture 3"/>
+          <p:cNvPicPr>
+            <a:picLocks noChangeAspect="1"/>
+          </p:cNvPicPr>
+          <p:nvPr/>
+        </p:nvPicPr>
+        <p:blipFill>
+          <a:blip r:embed="rId2"/>
+          <a:stretch>
+            <a:fillRect/>
+          </a:stretch>
+        </p:blipFill>
+        <p:spPr>
+          <a:xfrm>
+            <a:off x="990600" y="1752600"/>
+            <a:ext cx="7391400" cy="4899722"/>
+          </a:xfrm>
+          <a:prstGeom prst="rect">
+            <a:avLst/>
+          </a:prstGeom>
+        </p:spPr>
+      </p:pic>
+    </p:spTree>
+    <p:extLst>
+      <p:ext uri="{BB962C8B-B14F-4D97-AF65-F5344CB8AC3E}">
+        <p14:creationId xmlns:p14="http://schemas.microsoft.com/office/powerpoint/2010/main" val="887487479"/>
+      </p:ext>
+    </p:extLst>
+  </p:cSld>
+  <p:clrMapOvr>
+    <a:masterClrMapping/>
+  </p:clrMapOvr>
+</p:sld>
+</file>
+
+<file path=ppt/slides/slide13.xml><?xml version="1.0" encoding="utf-8"?>
+<p:sld xmlns:a="http://schemas.openxmlformats.org/drawingml/2006/main" xmlns:r="http://schemas.openxmlformats.org/officeDocument/2006/relationships" xmlns:p="http://schemas.openxmlformats.org/presentationml/2006/main">
+  <p:cSld>
+    <p:spTree>
+      <p:nvGrpSpPr>
+        <p:cNvPr id="1" name=""/>
+        <p:cNvGrpSpPr/>
+        <p:nvPr/>
+      </p:nvGrpSpPr>
+      <p:grpSpPr>
+        <a:xfrm>
+          <a:off x="0" y="0"/>
+          <a:ext cx="0" cy="0"/>
+          <a:chOff x="0" y="0"/>
+          <a:chExt cx="0" cy="0"/>
+        </a:xfrm>
+      </p:grpSpPr>
+      <p:sp>
+        <p:nvSpPr>
+          <p:cNvPr id="2" name="Title 1"/>
+          <p:cNvSpPr>
+            <a:spLocks noGrp="1"/>
+          </p:cNvSpPr>
+          <p:nvPr>
+            <p:ph type="title"/>
+          </p:nvPr>
+        </p:nvSpPr>
+        <p:spPr>
+          <a:xfrm>
+            <a:off x="685800" y="764373"/>
+            <a:ext cx="7863840" cy="1293028"/>
+          </a:xfrm>
+        </p:spPr>
+        <p:txBody>
+          <a:bodyPr/>
+          <a:lstStyle/>
+          <a:p>
+            <a:r>
+              <a:rPr lang="en-US" dirty="0" smtClean="0"/>
+              <a:t>Sequence diagrams – cont.</a:t>
+            </a:r>
+            <a:endParaRPr lang="en-US" dirty="0"/>
+          </a:p>
+        </p:txBody>
+      </p:sp>
+      <p:pic>
+        <p:nvPicPr>
+          <p:cNvPr id="4" name="Picture 3"/>
+          <p:cNvPicPr>
+            <a:picLocks noChangeAspect="1"/>
+          </p:cNvPicPr>
+          <p:nvPr/>
+        </p:nvPicPr>
+        <p:blipFill>
+          <a:blip r:embed="rId2"/>
+          <a:stretch>
+            <a:fillRect/>
+          </a:stretch>
+        </p:blipFill>
+        <p:spPr>
+          <a:xfrm>
+            <a:off x="1371600" y="2051305"/>
+            <a:ext cx="6613445" cy="4076700"/>
+          </a:xfrm>
+          <a:prstGeom prst="rect">
+            <a:avLst/>
+          </a:prstGeom>
+        </p:spPr>
+      </p:pic>
+    </p:spTree>
+    <p:extLst>
+      <p:ext uri="{BB962C8B-B14F-4D97-AF65-F5344CB8AC3E}">
+        <p14:creationId xmlns:p14="http://schemas.microsoft.com/office/powerpoint/2010/main" val="683119086"/>
+      </p:ext>
+    </p:extLst>
+  </p:cSld>
+  <p:clrMapOvr>
+    <a:masterClrMapping/>
+  </p:clrMapOvr>
+</p:sld>
+</file>
+
+<file path=ppt/slides/slide14.xml><?xml version="1.0" encoding="utf-8"?>
+<p:sld xmlns:a="http://schemas.openxmlformats.org/drawingml/2006/main" xmlns:r="http://schemas.openxmlformats.org/officeDocument/2006/relationships" xmlns:p="http://schemas.openxmlformats.org/presentationml/2006/main">
+  <p:cSld>
+    <p:spTree>
+      <p:nvGrpSpPr>
+        <p:cNvPr id="1" name=""/>
+        <p:cNvGrpSpPr/>
+        <p:nvPr/>
+      </p:nvGrpSpPr>
+      <p:grpSpPr>
+        <a:xfrm>
+          <a:off x="0" y="0"/>
+          <a:ext cx="0" cy="0"/>
+          <a:chOff x="0" y="0"/>
+          <a:chExt cx="0" cy="0"/>
+        </a:xfrm>
+      </p:grpSpPr>
+      <p:sp>
+        <p:nvSpPr>
+          <p:cNvPr id="2" name="Title 1"/>
+          <p:cNvSpPr>
+            <a:spLocks noGrp="1"/>
+          </p:cNvSpPr>
+          <p:nvPr>
+            <p:ph type="title"/>
+          </p:nvPr>
+        </p:nvSpPr>
         <p:spPr/>
         <p:txBody>
           <a:bodyPr/>
@@ -5949,7 +6262,1324 @@
           <a:p>
             <a:r>
               <a:rPr lang="en-US" dirty="0" smtClean="0"/>
-              <a:t>Sequence Diagrams</a:t>
+              <a:t>Exploratory studies</a:t>
+            </a:r>
+            <a:endParaRPr lang="en-US" dirty="0"/>
+          </a:p>
+        </p:txBody>
+      </p:sp>
+      <p:sp>
+        <p:nvSpPr>
+          <p:cNvPr id="3" name="Content Placeholder 2"/>
+          <p:cNvSpPr>
+            <a:spLocks noGrp="1"/>
+          </p:cNvSpPr>
+          <p:nvPr>
+            <p:ph idx="1"/>
+          </p:nvPr>
+        </p:nvSpPr>
+        <p:spPr/>
+        <p:txBody>
+          <a:bodyPr/>
+          <a:lstStyle/>
+          <a:p>
+            <a:r>
+              <a:rPr lang="en-US" b="1" dirty="0" smtClean="0"/>
+              <a:t>Relevant Techniques: </a:t>
+            </a:r>
+            <a:r>
+              <a:rPr lang="en-US" dirty="0" smtClean="0"/>
+              <a:t>Due to the nature of Unity Engine being component based, we plan to adopt a component based design.</a:t>
+            </a:r>
+          </a:p>
+          <a:p>
+            <a:r>
+              <a:rPr lang="en-US" b="1" dirty="0" smtClean="0"/>
+              <a:t>Relevant packages/products: </a:t>
+            </a:r>
+            <a:r>
+              <a:rPr lang="en-US" dirty="0" smtClean="0"/>
+              <a:t>The Unity asset store contains models, scripts, animations, and other assets we can use. We are experimenting with some currently to discover what we want to use in our prototype.</a:t>
+            </a:r>
+          </a:p>
+          <a:p>
+            <a:r>
+              <a:rPr lang="en-US" b="1" dirty="0" smtClean="0"/>
+              <a:t>Broader Impacts:</a:t>
+            </a:r>
+            <a:r>
+              <a:rPr lang="en-US" dirty="0" smtClean="0"/>
+              <a:t> Aside from Erie Insurance benefitting from our project, drivers and their families will benefit since they will give a second thought to distracted driving after using the application.</a:t>
+            </a:r>
+            <a:endParaRPr lang="en-US" b="1" dirty="0"/>
+          </a:p>
+        </p:txBody>
+      </p:sp>
+    </p:spTree>
+    <p:extLst>
+      <p:ext uri="{BB962C8B-B14F-4D97-AF65-F5344CB8AC3E}">
+        <p14:creationId xmlns:p14="http://schemas.microsoft.com/office/powerpoint/2010/main" val="3673460285"/>
+      </p:ext>
+    </p:extLst>
+  </p:cSld>
+  <p:clrMapOvr>
+    <a:masterClrMapping/>
+  </p:clrMapOvr>
+</p:sld>
+</file>
+
+<file path=ppt/slides/slide15.xml><?xml version="1.0" encoding="utf-8"?>
+<p:sld xmlns:a="http://schemas.openxmlformats.org/drawingml/2006/main" xmlns:r="http://schemas.openxmlformats.org/officeDocument/2006/relationships" xmlns:p="http://schemas.openxmlformats.org/presentationml/2006/main">
+  <p:cSld>
+    <p:spTree>
+      <p:nvGrpSpPr>
+        <p:cNvPr id="1" name=""/>
+        <p:cNvGrpSpPr/>
+        <p:nvPr/>
+      </p:nvGrpSpPr>
+      <p:grpSpPr>
+        <a:xfrm>
+          <a:off x="0" y="0"/>
+          <a:ext cx="0" cy="0"/>
+          <a:chOff x="0" y="0"/>
+          <a:chExt cx="0" cy="0"/>
+        </a:xfrm>
+      </p:grpSpPr>
+      <p:sp>
+        <p:nvSpPr>
+          <p:cNvPr id="2" name="Title 1"/>
+          <p:cNvSpPr>
+            <a:spLocks noGrp="1"/>
+          </p:cNvSpPr>
+          <p:nvPr>
+            <p:ph type="title"/>
+          </p:nvPr>
+        </p:nvSpPr>
+        <p:spPr>
+          <a:xfrm>
+            <a:off x="594360" y="764373"/>
+            <a:ext cx="7955280" cy="1293028"/>
+          </a:xfrm>
+        </p:spPr>
+        <p:txBody>
+          <a:bodyPr>
+            <a:normAutofit/>
+          </a:bodyPr>
+          <a:lstStyle/>
+          <a:p>
+            <a:r>
+              <a:rPr lang="en-US" dirty="0" smtClean="0"/>
+              <a:t>Initial consideration of system architecture</a:t>
+            </a:r>
+            <a:endParaRPr lang="en-US" dirty="0"/>
+          </a:p>
+        </p:txBody>
+      </p:sp>
+      <p:sp>
+        <p:nvSpPr>
+          <p:cNvPr id="3" name="Content Placeholder 2"/>
+          <p:cNvSpPr>
+            <a:spLocks noGrp="1"/>
+          </p:cNvSpPr>
+          <p:nvPr>
+            <p:ph idx="1"/>
+          </p:nvPr>
+        </p:nvSpPr>
+        <p:spPr>
+          <a:xfrm>
+            <a:off x="594360" y="2407920"/>
+            <a:ext cx="7955280" cy="4069080"/>
+          </a:xfrm>
+        </p:spPr>
+        <p:txBody>
+          <a:bodyPr>
+            <a:normAutofit/>
+          </a:bodyPr>
+          <a:lstStyle/>
+          <a:p>
+            <a:r>
+              <a:rPr lang="en-US" sz="3200" dirty="0" smtClean="0"/>
+              <a:t>We are currently considering the MVC architecture</a:t>
+            </a:r>
+          </a:p>
+          <a:p>
+            <a:r>
+              <a:rPr lang="en-US" sz="3200" dirty="0" smtClean="0"/>
+              <a:t>As we progress with a prototype, we will reassess our architecture</a:t>
+            </a:r>
+          </a:p>
+          <a:p>
+            <a:r>
+              <a:rPr lang="en-US" sz="3200" dirty="0" smtClean="0"/>
+              <a:t>We may adapt to another architecture if it makes sense to do so</a:t>
+            </a:r>
+            <a:endParaRPr lang="en-US" sz="3200" dirty="0"/>
+          </a:p>
+        </p:txBody>
+      </p:sp>
+    </p:spTree>
+    <p:extLst>
+      <p:ext uri="{BB962C8B-B14F-4D97-AF65-F5344CB8AC3E}">
+        <p14:creationId xmlns:p14="http://schemas.microsoft.com/office/powerpoint/2010/main" val="391028762"/>
+      </p:ext>
+    </p:extLst>
+  </p:cSld>
+  <p:clrMapOvr>
+    <a:masterClrMapping/>
+  </p:clrMapOvr>
+</p:sld>
+</file>
+
+<file path=ppt/slides/slide16.xml><?xml version="1.0" encoding="utf-8"?>
+<p:sld xmlns:a="http://schemas.openxmlformats.org/drawingml/2006/main" xmlns:r="http://schemas.openxmlformats.org/officeDocument/2006/relationships" xmlns:p="http://schemas.openxmlformats.org/presentationml/2006/main">
+  <p:cSld>
+    <p:spTree>
+      <p:nvGrpSpPr>
+        <p:cNvPr id="1" name=""/>
+        <p:cNvGrpSpPr/>
+        <p:nvPr/>
+      </p:nvGrpSpPr>
+      <p:grpSpPr>
+        <a:xfrm>
+          <a:off x="0" y="0"/>
+          <a:ext cx="0" cy="0"/>
+          <a:chOff x="0" y="0"/>
+          <a:chExt cx="0" cy="0"/>
+        </a:xfrm>
+      </p:grpSpPr>
+      <p:sp>
+        <p:nvSpPr>
+          <p:cNvPr id="2" name="Title 1"/>
+          <p:cNvSpPr>
+            <a:spLocks noGrp="1"/>
+          </p:cNvSpPr>
+          <p:nvPr>
+            <p:ph type="title"/>
+          </p:nvPr>
+        </p:nvSpPr>
+        <p:spPr>
+          <a:xfrm>
+            <a:off x="457200" y="764373"/>
+            <a:ext cx="8092440" cy="1293028"/>
+          </a:xfrm>
+        </p:spPr>
+        <p:txBody>
+          <a:bodyPr/>
+          <a:lstStyle/>
+          <a:p>
+            <a:r>
+              <a:rPr lang="en-US" dirty="0" smtClean="0"/>
+              <a:t>Development Environment</a:t>
+            </a:r>
+            <a:endParaRPr lang="en-US" dirty="0"/>
+          </a:p>
+        </p:txBody>
+      </p:sp>
+      <p:pic>
+        <p:nvPicPr>
+          <p:cNvPr id="7178" name="Picture 10" descr="https://pbs.twimg.com/profile_images/552902707300675584/_zzPQBoj.png"/>
+          <p:cNvPicPr>
+            <a:picLocks noChangeAspect="1" noChangeArrowheads="1"/>
+          </p:cNvPicPr>
+          <p:nvPr/>
+        </p:nvPicPr>
+        <p:blipFill>
+          <a:blip r:embed="rId2">
+            <a:extLst>
+              <a:ext uri="{28A0092B-C50C-407E-A947-70E740481C1C}">
+                <a14:useLocalDpi xmlns:a14="http://schemas.microsoft.com/office/drawing/2010/main" val="0"/>
+              </a:ext>
+            </a:extLst>
+          </a:blip>
+          <a:srcRect/>
+          <a:stretch>
+            <a:fillRect/>
+          </a:stretch>
+        </p:blipFill>
+        <p:spPr bwMode="auto">
+          <a:xfrm>
+            <a:off x="6324600" y="1732598"/>
+            <a:ext cx="2381250" cy="2381250"/>
+          </a:xfrm>
+          <a:prstGeom prst="rect">
+            <a:avLst/>
+          </a:prstGeom>
+          <a:noFill/>
+          <a:extLst>
+            <a:ext uri="{909E8E84-426E-40DD-AFC4-6F175D3DCCD1}">
+              <a14:hiddenFill xmlns:a14="http://schemas.microsoft.com/office/drawing/2010/main">
+                <a:solidFill>
+                  <a:srgbClr val="FFFFFF"/>
+                </a:solidFill>
+              </a14:hiddenFill>
+            </a:ext>
+          </a:extLst>
+        </p:spPr>
+      </p:pic>
+      <p:pic>
+        <p:nvPicPr>
+          <p:cNvPr id="7184" name="Picture 16" descr="Image result for unity"/>
+          <p:cNvPicPr>
+            <a:picLocks noChangeAspect="1" noChangeArrowheads="1"/>
+          </p:cNvPicPr>
+          <p:nvPr/>
+        </p:nvPicPr>
+        <p:blipFill>
+          <a:blip r:embed="rId3">
+            <a:extLst>
+              <a:ext uri="{28A0092B-C50C-407E-A947-70E740481C1C}">
+                <a14:useLocalDpi xmlns:a14="http://schemas.microsoft.com/office/drawing/2010/main" val="0"/>
+              </a:ext>
+            </a:extLst>
+          </a:blip>
+          <a:srcRect/>
+          <a:stretch>
+            <a:fillRect/>
+          </a:stretch>
+        </p:blipFill>
+        <p:spPr bwMode="auto">
+          <a:xfrm>
+            <a:off x="3886200" y="1733550"/>
+            <a:ext cx="2381250" cy="2381250"/>
+          </a:xfrm>
+          <a:prstGeom prst="rect">
+            <a:avLst/>
+          </a:prstGeom>
+          <a:noFill/>
+          <a:extLst>
+            <a:ext uri="{909E8E84-426E-40DD-AFC4-6F175D3DCCD1}">
+              <a14:hiddenFill xmlns:a14="http://schemas.microsoft.com/office/drawing/2010/main">
+                <a:solidFill>
+                  <a:srgbClr val="FFFFFF"/>
+                </a:solidFill>
+              </a14:hiddenFill>
+            </a:ext>
+          </a:extLst>
+        </p:spPr>
+      </p:pic>
+      <p:pic>
+        <p:nvPicPr>
+          <p:cNvPr id="7186" name="Picture 18" descr="Image result for google cardboard"/>
+          <p:cNvPicPr>
+            <a:picLocks noChangeAspect="1" noChangeArrowheads="1"/>
+          </p:cNvPicPr>
+          <p:nvPr/>
+        </p:nvPicPr>
+        <p:blipFill>
+          <a:blip r:embed="rId4">
+            <a:extLst>
+              <a:ext uri="{28A0092B-C50C-407E-A947-70E740481C1C}">
+                <a14:useLocalDpi xmlns:a14="http://schemas.microsoft.com/office/drawing/2010/main" val="0"/>
+              </a:ext>
+            </a:extLst>
+          </a:blip>
+          <a:srcRect/>
+          <a:stretch>
+            <a:fillRect/>
+          </a:stretch>
+        </p:blipFill>
+        <p:spPr bwMode="auto">
+          <a:xfrm>
+            <a:off x="4503420" y="4113848"/>
+            <a:ext cx="2381250" cy="2381250"/>
+          </a:xfrm>
+          <a:prstGeom prst="rect">
+            <a:avLst/>
+          </a:prstGeom>
+          <a:noFill/>
+          <a:extLst>
+            <a:ext uri="{909E8E84-426E-40DD-AFC4-6F175D3DCCD1}">
+              <a14:hiddenFill xmlns:a14="http://schemas.microsoft.com/office/drawing/2010/main">
+                <a:solidFill>
+                  <a:srgbClr val="FFFFFF"/>
+                </a:solidFill>
+              </a14:hiddenFill>
+            </a:ext>
+          </a:extLst>
+        </p:spPr>
+      </p:pic>
+      <p:pic>
+        <p:nvPicPr>
+          <p:cNvPr id="7188" name="Picture 20" descr="Image result for android"/>
+          <p:cNvPicPr>
+            <a:picLocks noChangeAspect="1" noChangeArrowheads="1"/>
+          </p:cNvPicPr>
+          <p:nvPr/>
+        </p:nvPicPr>
+        <p:blipFill>
+          <a:blip r:embed="rId5">
+            <a:extLst>
+              <a:ext uri="{28A0092B-C50C-407E-A947-70E740481C1C}">
+                <a14:useLocalDpi xmlns:a14="http://schemas.microsoft.com/office/drawing/2010/main" val="0"/>
+              </a:ext>
+            </a:extLst>
+          </a:blip>
+          <a:srcRect/>
+          <a:stretch>
+            <a:fillRect/>
+          </a:stretch>
+        </p:blipFill>
+        <p:spPr bwMode="auto">
+          <a:xfrm>
+            <a:off x="6553200" y="4113848"/>
+            <a:ext cx="2381250" cy="2381250"/>
+          </a:xfrm>
+          <a:prstGeom prst="rect">
+            <a:avLst/>
+          </a:prstGeom>
+          <a:noFill/>
+          <a:extLst>
+            <a:ext uri="{909E8E84-426E-40DD-AFC4-6F175D3DCCD1}">
+              <a14:hiddenFill xmlns:a14="http://schemas.microsoft.com/office/drawing/2010/main">
+                <a:solidFill>
+                  <a:srgbClr val="FFFFFF"/>
+                </a:solidFill>
+              </a14:hiddenFill>
+            </a:ext>
+          </a:extLst>
+        </p:spPr>
+      </p:pic>
+      <p:sp>
+        <p:nvSpPr>
+          <p:cNvPr id="3" name="TextBox 2"/>
+          <p:cNvSpPr txBox="1"/>
+          <p:nvPr/>
+        </p:nvSpPr>
+        <p:spPr>
+          <a:xfrm>
+            <a:off x="304800" y="2438400"/>
+            <a:ext cx="3733800" cy="2862322"/>
+          </a:xfrm>
+          <a:prstGeom prst="rect">
+            <a:avLst/>
+          </a:prstGeom>
+          <a:noFill/>
+        </p:spPr>
+        <p:txBody>
+          <a:bodyPr wrap="square" rtlCol="0">
+            <a:spAutoFit/>
+          </a:bodyPr>
+          <a:lstStyle/>
+          <a:p>
+            <a:r>
+              <a:rPr lang="en-US" b="1" dirty="0" smtClean="0"/>
+              <a:t>Hardware:</a:t>
+            </a:r>
+            <a:endParaRPr lang="en-US" dirty="0" smtClean="0"/>
+          </a:p>
+          <a:p>
+            <a:pPr marL="285750" indent="-285750">
+              <a:buFont typeface="Arial" panose="020B0604020202020204" pitchFamily="34" charset="0"/>
+              <a:buChar char="•"/>
+            </a:pPr>
+            <a:r>
+              <a:rPr lang="en-US" dirty="0" smtClean="0"/>
+              <a:t>Personal laptops</a:t>
+            </a:r>
+          </a:p>
+          <a:p>
+            <a:pPr marL="285750" indent="-285750">
+              <a:buFont typeface="Arial" panose="020B0604020202020204" pitchFamily="34" charset="0"/>
+              <a:buChar char="•"/>
+            </a:pPr>
+            <a:r>
+              <a:rPr lang="en-US" dirty="0" smtClean="0"/>
+              <a:t>Lab computers</a:t>
+            </a:r>
+          </a:p>
+          <a:p>
+            <a:pPr marL="285750" indent="-285750">
+              <a:buFont typeface="Arial" panose="020B0604020202020204" pitchFamily="34" charset="0"/>
+              <a:buChar char="•"/>
+            </a:pPr>
+            <a:r>
+              <a:rPr lang="en-US" dirty="0" smtClean="0"/>
+              <a:t>Home desktops</a:t>
+            </a:r>
+          </a:p>
+          <a:p>
+            <a:pPr marL="285750" indent="-285750">
+              <a:buFont typeface="Arial" panose="020B0604020202020204" pitchFamily="34" charset="0"/>
+              <a:buChar char="•"/>
+            </a:pPr>
+            <a:endParaRPr lang="en-US" dirty="0"/>
+          </a:p>
+          <a:p>
+            <a:r>
+              <a:rPr lang="en-US" b="1" dirty="0" smtClean="0"/>
+              <a:t>Software tools:</a:t>
+            </a:r>
+          </a:p>
+          <a:p>
+            <a:pPr marL="285750" indent="-285750">
+              <a:buFont typeface="Arial" panose="020B0604020202020204" pitchFamily="34" charset="0"/>
+              <a:buChar char="•"/>
+            </a:pPr>
+            <a:r>
+              <a:rPr lang="en-US" dirty="0" smtClean="0"/>
+              <a:t>C# in Visual Studio</a:t>
+            </a:r>
+          </a:p>
+          <a:p>
+            <a:pPr marL="285750" indent="-285750">
+              <a:buFont typeface="Arial" panose="020B0604020202020204" pitchFamily="34" charset="0"/>
+              <a:buChar char="•"/>
+            </a:pPr>
+            <a:r>
+              <a:rPr lang="en-US" dirty="0" smtClean="0"/>
+              <a:t>Versioning with Git</a:t>
+            </a:r>
+          </a:p>
+          <a:p>
+            <a:pPr marL="285750" indent="-285750">
+              <a:buFont typeface="Arial" panose="020B0604020202020204" pitchFamily="34" charset="0"/>
+              <a:buChar char="•"/>
+            </a:pPr>
+            <a:r>
+              <a:rPr lang="en-US" dirty="0" smtClean="0"/>
+              <a:t>Unity Test Tools package for testing</a:t>
+            </a:r>
+            <a:endParaRPr lang="en-US" dirty="0"/>
+          </a:p>
+        </p:txBody>
+      </p:sp>
+    </p:spTree>
+    <p:extLst>
+      <p:ext uri="{BB962C8B-B14F-4D97-AF65-F5344CB8AC3E}">
+        <p14:creationId xmlns:p14="http://schemas.microsoft.com/office/powerpoint/2010/main" val="1204134341"/>
+      </p:ext>
+    </p:extLst>
+  </p:cSld>
+  <p:clrMapOvr>
+    <a:masterClrMapping/>
+  </p:clrMapOvr>
+</p:sld>
+</file>
+
+<file path=ppt/slides/slide17.xml><?xml version="1.0" encoding="utf-8"?>
+<p:sld xmlns:a="http://schemas.openxmlformats.org/drawingml/2006/main" xmlns:r="http://schemas.openxmlformats.org/officeDocument/2006/relationships" xmlns:p="http://schemas.openxmlformats.org/presentationml/2006/main">
+  <p:cSld>
+    <p:spTree>
+      <p:nvGrpSpPr>
+        <p:cNvPr id="1" name=""/>
+        <p:cNvGrpSpPr/>
+        <p:nvPr/>
+      </p:nvGrpSpPr>
+      <p:grpSpPr>
+        <a:xfrm>
+          <a:off x="0" y="0"/>
+          <a:ext cx="0" cy="0"/>
+          <a:chOff x="0" y="0"/>
+          <a:chExt cx="0" cy="0"/>
+        </a:xfrm>
+      </p:grpSpPr>
+      <p:sp>
+        <p:nvSpPr>
+          <p:cNvPr id="2" name="Title 1"/>
+          <p:cNvSpPr>
+            <a:spLocks noGrp="1"/>
+          </p:cNvSpPr>
+          <p:nvPr>
+            <p:ph type="title"/>
+          </p:nvPr>
+        </p:nvSpPr>
+        <p:spPr/>
+        <p:txBody>
+          <a:bodyPr/>
+          <a:lstStyle/>
+          <a:p>
+            <a:r>
+              <a:rPr lang="en-US" dirty="0" smtClean="0"/>
+              <a:t>Wrap up</a:t>
+            </a:r>
+            <a:endParaRPr lang="en-US" dirty="0"/>
+          </a:p>
+        </p:txBody>
+      </p:sp>
+      <p:sp>
+        <p:nvSpPr>
+          <p:cNvPr id="3" name="Content Placeholder 2"/>
+          <p:cNvSpPr>
+            <a:spLocks noGrp="1"/>
+          </p:cNvSpPr>
+          <p:nvPr>
+            <p:ph idx="1"/>
+          </p:nvPr>
+        </p:nvSpPr>
+        <p:spPr>
+          <a:xfrm>
+            <a:off x="1295400" y="2941320"/>
+            <a:ext cx="6781800" cy="1325880"/>
+          </a:xfrm>
+        </p:spPr>
+        <p:txBody>
+          <a:bodyPr>
+            <a:noAutofit/>
+          </a:bodyPr>
+          <a:lstStyle/>
+          <a:p>
+            <a:pPr marL="0" indent="0">
+              <a:buNone/>
+            </a:pPr>
+            <a:r>
+              <a:rPr lang="en-US" sz="9600" dirty="0" smtClean="0"/>
+              <a:t>Questions?</a:t>
+            </a:r>
+            <a:endParaRPr lang="en-US" sz="9600" dirty="0"/>
+          </a:p>
+        </p:txBody>
+      </p:sp>
+    </p:spTree>
+    <p:extLst>
+      <p:ext uri="{BB962C8B-B14F-4D97-AF65-F5344CB8AC3E}">
+        <p14:creationId xmlns:p14="http://schemas.microsoft.com/office/powerpoint/2010/main" val="3637520302"/>
+      </p:ext>
+    </p:extLst>
+  </p:cSld>
+  <p:clrMapOvr>
+    <a:masterClrMapping/>
+  </p:clrMapOvr>
+</p:sld>
+</file>
+
+<file path=ppt/slides/slide2.xml><?xml version="1.0" encoding="utf-8"?>
+<p:sld xmlns:a="http://schemas.openxmlformats.org/drawingml/2006/main" xmlns:r="http://schemas.openxmlformats.org/officeDocument/2006/relationships" xmlns:p="http://schemas.openxmlformats.org/presentationml/2006/main">
+  <p:cSld>
+    <p:spTree>
+      <p:nvGrpSpPr>
+        <p:cNvPr id="1" name=""/>
+        <p:cNvGrpSpPr/>
+        <p:nvPr/>
+      </p:nvGrpSpPr>
+      <p:grpSpPr>
+        <a:xfrm>
+          <a:off x="0" y="0"/>
+          <a:ext cx="0" cy="0"/>
+          <a:chOff x="0" y="0"/>
+          <a:chExt cx="0" cy="0"/>
+        </a:xfrm>
+      </p:grpSpPr>
+      <p:sp>
+        <p:nvSpPr>
+          <p:cNvPr id="2" name="Title 1"/>
+          <p:cNvSpPr>
+            <a:spLocks noGrp="1"/>
+          </p:cNvSpPr>
+          <p:nvPr>
+            <p:ph type="title"/>
+          </p:nvPr>
+        </p:nvSpPr>
+        <p:spPr/>
+        <p:txBody>
+          <a:bodyPr/>
+          <a:lstStyle/>
+          <a:p>
+            <a:r>
+              <a:rPr lang="en-US" dirty="0" smtClean="0"/>
+              <a:t>Project Overview</a:t>
+            </a:r>
+            <a:endParaRPr lang="en-US" dirty="0"/>
+          </a:p>
+        </p:txBody>
+      </p:sp>
+      <p:sp>
+        <p:nvSpPr>
+          <p:cNvPr id="3" name="Content Placeholder 2"/>
+          <p:cNvSpPr>
+            <a:spLocks noGrp="1"/>
+          </p:cNvSpPr>
+          <p:nvPr>
+            <p:ph idx="1"/>
+          </p:nvPr>
+        </p:nvSpPr>
+        <p:spPr>
+          <a:xfrm>
+            <a:off x="304800" y="2194560"/>
+            <a:ext cx="8382000" cy="4069080"/>
+          </a:xfrm>
+        </p:spPr>
+        <p:txBody>
+          <a:bodyPr>
+            <a:normAutofit/>
+          </a:bodyPr>
+          <a:lstStyle/>
+          <a:p>
+            <a:r>
+              <a:rPr lang="en-US" sz="3600" dirty="0" smtClean="0"/>
+              <a:t>Sponsored by Erie Insurance</a:t>
+            </a:r>
+          </a:p>
+          <a:p>
+            <a:r>
+              <a:rPr lang="en-US" sz="3600" dirty="0" smtClean="0"/>
+              <a:t>Android app designed for agents to demonstrate the dangers of distracted driving to policy holders </a:t>
+            </a:r>
+          </a:p>
+          <a:p>
+            <a:r>
+              <a:rPr lang="en-US" sz="3600" dirty="0" smtClean="0"/>
+              <a:t>Utilizes Google Cardboard VR to create an immersive experience to engage younger audiences</a:t>
+            </a:r>
+            <a:endParaRPr lang="en-US" sz="3600" dirty="0"/>
+          </a:p>
+        </p:txBody>
+      </p:sp>
+    </p:spTree>
+    <p:extLst>
+      <p:ext uri="{BB962C8B-B14F-4D97-AF65-F5344CB8AC3E}">
+        <p14:creationId xmlns:p14="http://schemas.microsoft.com/office/powerpoint/2010/main" val="2747763330"/>
+      </p:ext>
+    </p:extLst>
+  </p:cSld>
+  <p:clrMapOvr>
+    <a:masterClrMapping/>
+  </p:clrMapOvr>
+</p:sld>
+</file>
+
+<file path=ppt/slides/slide3.xml><?xml version="1.0" encoding="utf-8"?>
+<p:sld xmlns:a="http://schemas.openxmlformats.org/drawingml/2006/main" xmlns:r="http://schemas.openxmlformats.org/officeDocument/2006/relationships" xmlns:p="http://schemas.openxmlformats.org/presentationml/2006/main">
+  <p:cSld>
+    <p:spTree>
+      <p:nvGrpSpPr>
+        <p:cNvPr id="1" name=""/>
+        <p:cNvGrpSpPr/>
+        <p:nvPr/>
+      </p:nvGrpSpPr>
+      <p:grpSpPr>
+        <a:xfrm>
+          <a:off x="0" y="0"/>
+          <a:ext cx="0" cy="0"/>
+          <a:chOff x="0" y="0"/>
+          <a:chExt cx="0" cy="0"/>
+        </a:xfrm>
+      </p:grpSpPr>
+      <p:sp>
+        <p:nvSpPr>
+          <p:cNvPr id="2" name="Title 1"/>
+          <p:cNvSpPr>
+            <a:spLocks noGrp="1"/>
+          </p:cNvSpPr>
+          <p:nvPr>
+            <p:ph type="title"/>
+          </p:nvPr>
+        </p:nvSpPr>
+        <p:spPr>
+          <a:xfrm>
+            <a:off x="2171700" y="152400"/>
+            <a:ext cx="6377940" cy="1293028"/>
+          </a:xfrm>
+        </p:spPr>
+        <p:txBody>
+          <a:bodyPr/>
+          <a:lstStyle/>
+          <a:p>
+            <a:r>
+              <a:rPr lang="en-US" dirty="0" smtClean="0"/>
+              <a:t>Business Problem</a:t>
+            </a:r>
+            <a:endParaRPr lang="en-US" dirty="0"/>
+          </a:p>
+        </p:txBody>
+      </p:sp>
+      <p:sp>
+        <p:nvSpPr>
+          <p:cNvPr id="3" name="Content Placeholder 2"/>
+          <p:cNvSpPr>
+            <a:spLocks noGrp="1"/>
+          </p:cNvSpPr>
+          <p:nvPr>
+            <p:ph idx="1"/>
+          </p:nvPr>
+        </p:nvSpPr>
+        <p:spPr>
+          <a:xfrm>
+            <a:off x="594360" y="1722120"/>
+            <a:ext cx="7955280" cy="4373880"/>
+          </a:xfrm>
+        </p:spPr>
+        <p:txBody>
+          <a:bodyPr>
+            <a:noAutofit/>
+          </a:bodyPr>
+          <a:lstStyle/>
+          <a:p>
+            <a:r>
+              <a:rPr lang="en-US" sz="2000" b="1" dirty="0" smtClean="0"/>
+              <a:t>Project Background:</a:t>
+            </a:r>
+            <a:r>
+              <a:rPr lang="en-US" sz="2000" dirty="0" smtClean="0"/>
+              <a:t> Distracted driving is becoming more prevalent with the rise of technology. Erie Insurance is invested in increasing awareness about this issue.</a:t>
+            </a:r>
+          </a:p>
+          <a:p>
+            <a:r>
+              <a:rPr lang="en-US" sz="2000" b="1" dirty="0" smtClean="0"/>
+              <a:t>Project Needs:</a:t>
+            </a:r>
+            <a:r>
+              <a:rPr lang="en-US" sz="2000" dirty="0" smtClean="0"/>
+              <a:t> Erie Insurance is looking for an innovative solution to engage younger audiences in learning about the dangers of distracted driving.</a:t>
+            </a:r>
+          </a:p>
+          <a:p>
+            <a:r>
+              <a:rPr lang="en-US" sz="2000" b="1" dirty="0" smtClean="0"/>
+              <a:t>Project Objective:</a:t>
+            </a:r>
+            <a:r>
+              <a:rPr lang="en-US" sz="2000" dirty="0" smtClean="0"/>
+              <a:t> This project aims to utilize virtual reality technology to create an immersive experience that involves users of all ages.</a:t>
+            </a:r>
+          </a:p>
+          <a:p>
+            <a:r>
+              <a:rPr lang="en-US" sz="2000" b="1" dirty="0" smtClean="0"/>
+              <a:t>Broader Impacts:</a:t>
+            </a:r>
+            <a:r>
+              <a:rPr lang="en-US" sz="2000" dirty="0"/>
+              <a:t> This virtual reality experience has the potential to help minimize distracted </a:t>
+            </a:r>
+            <a:r>
+              <a:rPr lang="en-US" sz="2000" dirty="0" smtClean="0"/>
+              <a:t>driving. Since </a:t>
+            </a:r>
+            <a:r>
+              <a:rPr lang="en-US" sz="2000" dirty="0"/>
+              <a:t>the application runs on the Android operating system, which is used by millions of people every day, this application has the potential to reach a large number of drivers and passengers.</a:t>
+            </a:r>
+            <a:endParaRPr lang="en-US" sz="2000" b="1" dirty="0"/>
+          </a:p>
+        </p:txBody>
+      </p:sp>
+    </p:spTree>
+    <p:extLst>
+      <p:ext uri="{BB962C8B-B14F-4D97-AF65-F5344CB8AC3E}">
+        <p14:creationId xmlns:p14="http://schemas.microsoft.com/office/powerpoint/2010/main" val="2288543293"/>
+      </p:ext>
+    </p:extLst>
+  </p:cSld>
+  <p:clrMapOvr>
+    <a:masterClrMapping/>
+  </p:clrMapOvr>
+</p:sld>
+</file>
+
+<file path=ppt/slides/slide4.xml><?xml version="1.0" encoding="utf-8"?>
+<p:sld xmlns:a="http://schemas.openxmlformats.org/drawingml/2006/main" xmlns:r="http://schemas.openxmlformats.org/officeDocument/2006/relationships" xmlns:p="http://schemas.openxmlformats.org/presentationml/2006/main">
+  <p:cSld>
+    <p:spTree>
+      <p:nvGrpSpPr>
+        <p:cNvPr id="1" name=""/>
+        <p:cNvGrpSpPr/>
+        <p:nvPr/>
+      </p:nvGrpSpPr>
+      <p:grpSpPr>
+        <a:xfrm>
+          <a:off x="0" y="0"/>
+          <a:ext cx="0" cy="0"/>
+          <a:chOff x="0" y="0"/>
+          <a:chExt cx="0" cy="0"/>
+        </a:xfrm>
+      </p:grpSpPr>
+      <p:sp>
+        <p:nvSpPr>
+          <p:cNvPr id="2" name="Title 1"/>
+          <p:cNvSpPr>
+            <a:spLocks noGrp="1"/>
+          </p:cNvSpPr>
+          <p:nvPr>
+            <p:ph type="title"/>
+          </p:nvPr>
+        </p:nvSpPr>
+        <p:spPr/>
+        <p:txBody>
+          <a:bodyPr/>
+          <a:lstStyle/>
+          <a:p>
+            <a:r>
+              <a:rPr lang="en-US" dirty="0" smtClean="0"/>
+              <a:t>Development Process</a:t>
+            </a:r>
+            <a:endParaRPr lang="en-US" dirty="0"/>
+          </a:p>
+        </p:txBody>
+      </p:sp>
+      <p:pic>
+        <p:nvPicPr>
+          <p:cNvPr id="5" name="Picture 4"/>
+          <p:cNvPicPr>
+            <a:picLocks noChangeAspect="1"/>
+          </p:cNvPicPr>
+          <p:nvPr/>
+        </p:nvPicPr>
+        <p:blipFill>
+          <a:blip r:embed="rId2"/>
+          <a:stretch>
+            <a:fillRect/>
+          </a:stretch>
+        </p:blipFill>
+        <p:spPr>
+          <a:xfrm>
+            <a:off x="457200" y="1828800"/>
+            <a:ext cx="8279785" cy="4638675"/>
+          </a:xfrm>
+          <a:prstGeom prst="rect">
+            <a:avLst/>
+          </a:prstGeom>
+        </p:spPr>
+      </p:pic>
+    </p:spTree>
+    <p:extLst>
+      <p:ext uri="{BB962C8B-B14F-4D97-AF65-F5344CB8AC3E}">
+        <p14:creationId xmlns:p14="http://schemas.microsoft.com/office/powerpoint/2010/main" val="2551059484"/>
+      </p:ext>
+    </p:extLst>
+  </p:cSld>
+  <p:clrMapOvr>
+    <a:masterClrMapping/>
+  </p:clrMapOvr>
+</p:sld>
+</file>
+
+<file path=ppt/slides/slide5.xml><?xml version="1.0" encoding="utf-8"?>
+<p:sld xmlns:a="http://schemas.openxmlformats.org/drawingml/2006/main" xmlns:r="http://schemas.openxmlformats.org/officeDocument/2006/relationships" xmlns:p="http://schemas.openxmlformats.org/presentationml/2006/main">
+  <p:cSld>
+    <p:spTree>
+      <p:nvGrpSpPr>
+        <p:cNvPr id="1" name=""/>
+        <p:cNvGrpSpPr/>
+        <p:nvPr/>
+      </p:nvGrpSpPr>
+      <p:grpSpPr>
+        <a:xfrm>
+          <a:off x="0" y="0"/>
+          <a:ext cx="0" cy="0"/>
+          <a:chOff x="0" y="0"/>
+          <a:chExt cx="0" cy="0"/>
+        </a:xfrm>
+      </p:grpSpPr>
+      <p:sp>
+        <p:nvSpPr>
+          <p:cNvPr id="2" name="Title 1"/>
+          <p:cNvSpPr>
+            <a:spLocks noGrp="1"/>
+          </p:cNvSpPr>
+          <p:nvPr>
+            <p:ph type="title"/>
+          </p:nvPr>
+        </p:nvSpPr>
+        <p:spPr>
+          <a:xfrm>
+            <a:off x="670560" y="609600"/>
+            <a:ext cx="8244840" cy="1293028"/>
+          </a:xfrm>
+        </p:spPr>
+        <p:txBody>
+          <a:bodyPr>
+            <a:normAutofit fontScale="90000"/>
+          </a:bodyPr>
+          <a:lstStyle/>
+          <a:p>
+            <a:r>
+              <a:rPr lang="en-US" dirty="0" smtClean="0"/>
+              <a:t>Initial </a:t>
+            </a:r>
+            <a:r>
+              <a:rPr lang="en-US" dirty="0" smtClean="0"/>
+              <a:t>user </a:t>
+            </a:r>
+            <a:r>
+              <a:rPr lang="en-US" dirty="0" smtClean="0"/>
+              <a:t>requirements &amp; engineered system Requirements</a:t>
+            </a:r>
+            <a:endParaRPr lang="en-US" dirty="0"/>
+          </a:p>
+        </p:txBody>
+      </p:sp>
+      <p:pic>
+        <p:nvPicPr>
+          <p:cNvPr id="3" name="Picture 2"/>
+          <p:cNvPicPr>
+            <a:picLocks noChangeAspect="1"/>
+          </p:cNvPicPr>
+          <p:nvPr/>
+        </p:nvPicPr>
+        <p:blipFill>
+          <a:blip r:embed="rId2"/>
+          <a:stretch>
+            <a:fillRect/>
+          </a:stretch>
+        </p:blipFill>
+        <p:spPr>
+          <a:xfrm>
+            <a:off x="1295400" y="1828800"/>
+            <a:ext cx="6667500" cy="4428745"/>
+          </a:xfrm>
+          <a:prstGeom prst="rect">
+            <a:avLst/>
+          </a:prstGeom>
+        </p:spPr>
+      </p:pic>
+      <p:sp>
+        <p:nvSpPr>
+          <p:cNvPr id="4" name="TextBox 3"/>
+          <p:cNvSpPr txBox="1"/>
+          <p:nvPr/>
+        </p:nvSpPr>
+        <p:spPr>
+          <a:xfrm>
+            <a:off x="1219200" y="6248400"/>
+            <a:ext cx="7315200" cy="415498"/>
+          </a:xfrm>
+          <a:prstGeom prst="rect">
+            <a:avLst/>
+          </a:prstGeom>
+          <a:noFill/>
+        </p:spPr>
+        <p:txBody>
+          <a:bodyPr wrap="square" rtlCol="0">
+            <a:spAutoFit/>
+          </a:bodyPr>
+          <a:lstStyle/>
+          <a:p>
+            <a:r>
+              <a:rPr lang="en-US" sz="1050" dirty="0" smtClean="0"/>
+              <a:t>Note: These are our initial set of requirements. We may add new requirements as we progress and current requirements may change in the future.</a:t>
+            </a:r>
+            <a:endParaRPr lang="en-US" sz="1050" dirty="0"/>
+          </a:p>
+        </p:txBody>
+      </p:sp>
+    </p:spTree>
+    <p:extLst>
+      <p:ext uri="{BB962C8B-B14F-4D97-AF65-F5344CB8AC3E}">
+        <p14:creationId xmlns:p14="http://schemas.microsoft.com/office/powerpoint/2010/main" val="664915384"/>
+      </p:ext>
+    </p:extLst>
+  </p:cSld>
+  <p:clrMapOvr>
+    <a:masterClrMapping/>
+  </p:clrMapOvr>
+</p:sld>
+</file>
+
+<file path=ppt/slides/slide6.xml><?xml version="1.0" encoding="utf-8"?>
+<p:sld xmlns:a="http://schemas.openxmlformats.org/drawingml/2006/main" xmlns:r="http://schemas.openxmlformats.org/officeDocument/2006/relationships" xmlns:p="http://schemas.openxmlformats.org/presentationml/2006/main">
+  <p:cSld>
+    <p:spTree>
+      <p:nvGrpSpPr>
+        <p:cNvPr id="1" name=""/>
+        <p:cNvGrpSpPr/>
+        <p:nvPr/>
+      </p:nvGrpSpPr>
+      <p:grpSpPr>
+        <a:xfrm>
+          <a:off x="0" y="0"/>
+          <a:ext cx="0" cy="0"/>
+          <a:chOff x="0" y="0"/>
+          <a:chExt cx="0" cy="0"/>
+        </a:xfrm>
+      </p:grpSpPr>
+      <p:sp>
+        <p:nvSpPr>
+          <p:cNvPr id="2" name="Title 1"/>
+          <p:cNvSpPr>
+            <a:spLocks noGrp="1"/>
+          </p:cNvSpPr>
+          <p:nvPr>
+            <p:ph type="title"/>
+          </p:nvPr>
+        </p:nvSpPr>
+        <p:spPr/>
+        <p:txBody>
+          <a:bodyPr/>
+          <a:lstStyle/>
+          <a:p>
+            <a:r>
+              <a:rPr lang="en-US" dirty="0" smtClean="0"/>
+              <a:t>Requirements – Cont.</a:t>
+            </a:r>
+            <a:endParaRPr lang="en-US" dirty="0"/>
+          </a:p>
+        </p:txBody>
+      </p:sp>
+      <p:pic>
+        <p:nvPicPr>
+          <p:cNvPr id="2050" name="Picture 2"/>
+          <p:cNvPicPr>
+            <a:picLocks noChangeAspect="1" noChangeArrowheads="1"/>
+          </p:cNvPicPr>
+          <p:nvPr/>
+        </p:nvPicPr>
+        <p:blipFill>
+          <a:blip r:embed="rId2">
+            <a:extLst>
+              <a:ext uri="{28A0092B-C50C-407E-A947-70E740481C1C}">
+                <a14:useLocalDpi xmlns:a14="http://schemas.microsoft.com/office/drawing/2010/main" val="0"/>
+              </a:ext>
+            </a:extLst>
+          </a:blip>
+          <a:srcRect/>
+          <a:stretch>
+            <a:fillRect/>
+          </a:stretch>
+        </p:blipFill>
+        <p:spPr bwMode="auto">
+          <a:xfrm>
+            <a:off x="1233488" y="2228850"/>
+            <a:ext cx="6677025" cy="2400300"/>
+          </a:xfrm>
+          <a:prstGeom prst="rect">
+            <a:avLst/>
+          </a:prstGeom>
+          <a:noFill/>
+          <a:ln>
+            <a:noFill/>
+          </a:ln>
+          <a:extLst>
+            <a:ext uri="{909E8E84-426E-40DD-AFC4-6F175D3DCCD1}">
+              <a14:hiddenFill xmlns:a14="http://schemas.microsoft.com/office/drawing/2010/main">
+                <a:solidFill>
+                  <a:schemeClr val="accent1"/>
+                </a:solidFill>
+              </a14:hiddenFill>
+            </a:ext>
+            <a:ext uri="{91240B29-F687-4F45-9708-019B960494DF}">
+              <a14:hiddenLine xmlns:a14="http://schemas.microsoft.com/office/drawing/2010/main" w="9525">
+                <a:solidFill>
+                  <a:schemeClr val="tx1"/>
+                </a:solidFill>
+                <a:miter lim="800000"/>
+                <a:headEnd/>
+                <a:tailEnd/>
+              </a14:hiddenLine>
+            </a:ext>
+          </a:extLst>
+        </p:spPr>
+      </p:pic>
+      <p:sp>
+        <p:nvSpPr>
+          <p:cNvPr id="4" name="TextBox 3"/>
+          <p:cNvSpPr txBox="1"/>
+          <p:nvPr/>
+        </p:nvSpPr>
+        <p:spPr>
+          <a:xfrm>
+            <a:off x="1219200" y="6248400"/>
+            <a:ext cx="7315200" cy="415498"/>
+          </a:xfrm>
+          <a:prstGeom prst="rect">
+            <a:avLst/>
+          </a:prstGeom>
+          <a:noFill/>
+        </p:spPr>
+        <p:txBody>
+          <a:bodyPr wrap="square" rtlCol="0">
+            <a:spAutoFit/>
+          </a:bodyPr>
+          <a:lstStyle/>
+          <a:p>
+            <a:r>
+              <a:rPr lang="en-US" sz="1050" dirty="0" smtClean="0"/>
+              <a:t>Note: These are our initial set of requirements. We may add new requirements as we progress and current requirements may change in the future.</a:t>
+            </a:r>
+            <a:endParaRPr lang="en-US" sz="1050" dirty="0"/>
+          </a:p>
+        </p:txBody>
+      </p:sp>
+    </p:spTree>
+    <p:extLst>
+      <p:ext uri="{BB962C8B-B14F-4D97-AF65-F5344CB8AC3E}">
+        <p14:creationId xmlns:p14="http://schemas.microsoft.com/office/powerpoint/2010/main" val="1865500975"/>
+      </p:ext>
+    </p:extLst>
+  </p:cSld>
+  <p:clrMapOvr>
+    <a:masterClrMapping/>
+  </p:clrMapOvr>
+</p:sld>
+</file>
+
+<file path=ppt/slides/slide7.xml><?xml version="1.0" encoding="utf-8"?>
+<p:sld xmlns:a="http://schemas.openxmlformats.org/drawingml/2006/main" xmlns:r="http://schemas.openxmlformats.org/officeDocument/2006/relationships" xmlns:p="http://schemas.openxmlformats.org/presentationml/2006/main">
+  <p:cSld>
+    <p:spTree>
+      <p:nvGrpSpPr>
+        <p:cNvPr id="1" name=""/>
+        <p:cNvGrpSpPr/>
+        <p:nvPr/>
+      </p:nvGrpSpPr>
+      <p:grpSpPr>
+        <a:xfrm>
+          <a:off x="0" y="0"/>
+          <a:ext cx="0" cy="0"/>
+          <a:chOff x="0" y="0"/>
+          <a:chExt cx="0" cy="0"/>
+        </a:xfrm>
+      </p:grpSpPr>
+      <p:sp>
+        <p:nvSpPr>
+          <p:cNvPr id="2" name="Title 1"/>
+          <p:cNvSpPr>
+            <a:spLocks noGrp="1"/>
+          </p:cNvSpPr>
+          <p:nvPr>
+            <p:ph type="title"/>
+          </p:nvPr>
+        </p:nvSpPr>
+        <p:spPr/>
+        <p:txBody>
+          <a:bodyPr/>
+          <a:lstStyle/>
+          <a:p>
+            <a:r>
+              <a:rPr lang="en-US" dirty="0" smtClean="0"/>
+              <a:t>Requirements – Cont.</a:t>
+            </a:r>
+            <a:endParaRPr lang="en-US" dirty="0"/>
+          </a:p>
+        </p:txBody>
+      </p:sp>
+      <p:pic>
+        <p:nvPicPr>
+          <p:cNvPr id="3074" name="Picture 2"/>
+          <p:cNvPicPr>
+            <a:picLocks noChangeAspect="1" noChangeArrowheads="1"/>
+          </p:cNvPicPr>
+          <p:nvPr/>
+        </p:nvPicPr>
+        <p:blipFill>
+          <a:blip r:embed="rId2">
+            <a:extLst>
+              <a:ext uri="{28A0092B-C50C-407E-A947-70E740481C1C}">
+                <a14:useLocalDpi xmlns:a14="http://schemas.microsoft.com/office/drawing/2010/main" val="0"/>
+              </a:ext>
+            </a:extLst>
+          </a:blip>
+          <a:srcRect/>
+          <a:stretch>
+            <a:fillRect/>
+          </a:stretch>
+        </p:blipFill>
+        <p:spPr bwMode="auto">
+          <a:xfrm>
+            <a:off x="1233488" y="2209800"/>
+            <a:ext cx="6677025" cy="1819275"/>
+          </a:xfrm>
+          <a:prstGeom prst="rect">
+            <a:avLst/>
+          </a:prstGeom>
+          <a:noFill/>
+          <a:ln>
+            <a:noFill/>
+          </a:ln>
+          <a:extLst>
+            <a:ext uri="{909E8E84-426E-40DD-AFC4-6F175D3DCCD1}">
+              <a14:hiddenFill xmlns:a14="http://schemas.microsoft.com/office/drawing/2010/main">
+                <a:solidFill>
+                  <a:schemeClr val="accent1"/>
+                </a:solidFill>
+              </a14:hiddenFill>
+            </a:ext>
+            <a:ext uri="{91240B29-F687-4F45-9708-019B960494DF}">
+              <a14:hiddenLine xmlns:a14="http://schemas.microsoft.com/office/drawing/2010/main" w="9525">
+                <a:solidFill>
+                  <a:schemeClr val="tx1"/>
+                </a:solidFill>
+                <a:miter lim="800000"/>
+                <a:headEnd/>
+                <a:tailEnd/>
+              </a14:hiddenLine>
+            </a:ext>
+          </a:extLst>
+        </p:spPr>
+      </p:pic>
+      <p:sp>
+        <p:nvSpPr>
+          <p:cNvPr id="4" name="TextBox 3"/>
+          <p:cNvSpPr txBox="1"/>
+          <p:nvPr/>
+        </p:nvSpPr>
+        <p:spPr>
+          <a:xfrm>
+            <a:off x="1219200" y="6248400"/>
+            <a:ext cx="7315200" cy="415498"/>
+          </a:xfrm>
+          <a:prstGeom prst="rect">
+            <a:avLst/>
+          </a:prstGeom>
+          <a:noFill/>
+        </p:spPr>
+        <p:txBody>
+          <a:bodyPr wrap="square" rtlCol="0">
+            <a:spAutoFit/>
+          </a:bodyPr>
+          <a:lstStyle/>
+          <a:p>
+            <a:r>
+              <a:rPr lang="en-US" sz="1050" dirty="0" smtClean="0"/>
+              <a:t>Note: These are our initial set of requirements. We may add new requirements as we progress and current requirements may change in the future.</a:t>
+            </a:r>
+            <a:endParaRPr lang="en-US" sz="1050" dirty="0"/>
+          </a:p>
+        </p:txBody>
+      </p:sp>
+    </p:spTree>
+    <p:extLst>
+      <p:ext uri="{BB962C8B-B14F-4D97-AF65-F5344CB8AC3E}">
+        <p14:creationId xmlns:p14="http://schemas.microsoft.com/office/powerpoint/2010/main" val="1693246604"/>
+      </p:ext>
+    </p:extLst>
+  </p:cSld>
+  <p:clrMapOvr>
+    <a:masterClrMapping/>
+  </p:clrMapOvr>
+</p:sld>
+</file>
+
+<file path=ppt/slides/slide8.xml><?xml version="1.0" encoding="utf-8"?>
+<p:sld xmlns:a="http://schemas.openxmlformats.org/drawingml/2006/main" xmlns:r="http://schemas.openxmlformats.org/officeDocument/2006/relationships" xmlns:p="http://schemas.openxmlformats.org/presentationml/2006/main">
+  <p:cSld>
+    <p:spTree>
+      <p:nvGrpSpPr>
+        <p:cNvPr id="1" name=""/>
+        <p:cNvGrpSpPr/>
+        <p:nvPr/>
+      </p:nvGrpSpPr>
+      <p:grpSpPr>
+        <a:xfrm>
+          <a:off x="0" y="0"/>
+          <a:ext cx="0" cy="0"/>
+          <a:chOff x="0" y="0"/>
+          <a:chExt cx="0" cy="0"/>
+        </a:xfrm>
+      </p:grpSpPr>
+      <p:sp>
+        <p:nvSpPr>
+          <p:cNvPr id="2" name="Title 1"/>
+          <p:cNvSpPr>
+            <a:spLocks noGrp="1"/>
+          </p:cNvSpPr>
+          <p:nvPr>
+            <p:ph type="title"/>
+          </p:nvPr>
+        </p:nvSpPr>
+        <p:spPr>
+          <a:xfrm>
+            <a:off x="2171700" y="0"/>
+            <a:ext cx="6377940" cy="1293028"/>
+          </a:xfrm>
+        </p:spPr>
+        <p:txBody>
+          <a:bodyPr/>
+          <a:lstStyle/>
+          <a:p>
+            <a:r>
+              <a:rPr lang="en-US" dirty="0" smtClean="0"/>
+              <a:t>Use Case Diagram</a:t>
             </a:r>
             <a:endParaRPr lang="en-US" dirty="0"/>
           </a:p>
@@ -6027,25 +7657,25 @@
           <p:nvPr>
             <p:extLst>
               <p:ext uri="{D42A27DB-BD31-4B8C-83A1-F6EECF244321}">
-                <p14:modId xmlns:p14="http://schemas.microsoft.com/office/powerpoint/2010/main" val="1260554635"/>
+                <p14:modId xmlns:p14="http://schemas.microsoft.com/office/powerpoint/2010/main" val="1755622135"/>
               </p:ext>
             </p:extLst>
           </p:nvPr>
         </p:nvGraphicFramePr>
         <p:xfrm>
-          <a:off x="1752600" y="1955006"/>
-          <a:ext cx="5753100" cy="4674394"/>
+          <a:off x="1600200" y="1066800"/>
+          <a:ext cx="6032648" cy="2914650"/>
         </p:xfrm>
         <a:graphic>
           <a:graphicData uri="http://schemas.openxmlformats.org/presentationml/2006/ole">
             <mc:AlternateContent xmlns:mc="http://schemas.openxmlformats.org/markup-compatibility/2006">
               <mc:Choice xmlns:v="urn:schemas-microsoft-com:vml" Requires="v">
-                <p:oleObj spid="_x0000_s5128" r:id="rId4" imgW="6305443" imgH="5124330" progId="Visio.Drawing.15">
+                <p:oleObj spid="_x0000_s4120" r:id="rId3" imgW="5086333" imgH="2457540" progId="Visio.Drawing.15">
                   <p:embed/>
                 </p:oleObj>
               </mc:Choice>
               <mc:Fallback>
-                <p:oleObj r:id="rId4" imgW="6305443" imgH="5124330" progId="Visio.Drawing.15">
+                <p:oleObj r:id="rId3" imgW="5086333" imgH="2457540" progId="Visio.Drawing.15">
                   <p:embed/>
                   <p:pic>
                     <p:nvPicPr>
@@ -6056,7 +7686,7 @@
                       <p:nvPr/>
                     </p:nvPicPr>
                     <p:blipFill>
-                      <a:blip r:embed="rId5">
+                      <a:blip r:embed="rId4">
                         <a:extLst>
                           <a:ext uri="{28A0092B-C50C-407E-A947-70E740481C1C}">
                             <a14:useLocalDpi xmlns:a14="http://schemas.microsoft.com/office/drawing/2010/main" val="0"/>
@@ -6070,8 +7700,8 @@
                     </p:blipFill>
                     <p:spPr bwMode="auto">
                       <a:xfrm>
-                        <a:off x="1752600" y="1955006"/>
-                        <a:ext cx="5753100" cy="4674394"/>
+                        <a:off x="1600200" y="1066800"/>
+                        <a:ext cx="6032648" cy="2914650"/>
                       </a:xfrm>
                       <a:prstGeom prst="rect">
                         <a:avLst/>
@@ -6085,10 +7715,64 @@
           </a:graphicData>
         </a:graphic>
       </p:graphicFrame>
+      <p:sp>
+        <p:nvSpPr>
+          <p:cNvPr id="6" name="TextBox 5"/>
+          <p:cNvSpPr txBox="1"/>
+          <p:nvPr/>
+        </p:nvSpPr>
+        <p:spPr>
+          <a:xfrm>
+            <a:off x="1143000" y="5410200"/>
+            <a:ext cx="7315200" cy="646331"/>
+          </a:xfrm>
+          <a:prstGeom prst="rect">
+            <a:avLst/>
+          </a:prstGeom>
+          <a:noFill/>
+        </p:spPr>
+        <p:txBody>
+          <a:bodyPr wrap="square" rtlCol="0">
+            <a:spAutoFit/>
+          </a:bodyPr>
+          <a:lstStyle/>
+          <a:p>
+            <a:r>
+              <a:rPr lang="en-US" dirty="0" smtClean="0"/>
+              <a:t>This is our current use case diagram to meet our industry partner’s needs. These use cases may change in the future.</a:t>
+            </a:r>
+            <a:endParaRPr lang="en-US" dirty="0"/>
+          </a:p>
+        </p:txBody>
+      </p:sp>
+      <p:pic>
+        <p:nvPicPr>
+          <p:cNvPr id="3" name="Picture 2"/>
+          <p:cNvPicPr>
+            <a:picLocks noChangeAspect="1"/>
+          </p:cNvPicPr>
+          <p:nvPr/>
+        </p:nvPicPr>
+        <p:blipFill>
+          <a:blip r:embed="rId5"/>
+          <a:stretch>
+            <a:fillRect/>
+          </a:stretch>
+        </p:blipFill>
+        <p:spPr>
+          <a:xfrm>
+            <a:off x="1362075" y="4143375"/>
+            <a:ext cx="6638925" cy="1114425"/>
+          </a:xfrm>
+          <a:prstGeom prst="rect">
+            <a:avLst/>
+          </a:prstGeom>
+        </p:spPr>
+      </p:pic>
     </p:spTree>
     <p:extLst>
       <p:ext uri="{BB962C8B-B14F-4D97-AF65-F5344CB8AC3E}">
-        <p14:creationId xmlns:p14="http://schemas.microsoft.com/office/powerpoint/2010/main" val="2278986696"/>
+        <p14:creationId xmlns:p14="http://schemas.microsoft.com/office/powerpoint/2010/main" val="549260242"/>
       </p:ext>
     </p:extLst>
   </p:cSld>
@@ -6098,7 +7782,7 @@
 </p:sld>
 </file>
 
-<file path=ppt/slides/slide12.xml><?xml version="1.0" encoding="utf-8"?>
+<file path=ppt/slides/slide9.xml><?xml version="1.0" encoding="utf-8"?>
 <p:sld xmlns:a="http://schemas.openxmlformats.org/drawingml/2006/main" xmlns:r="http://schemas.openxmlformats.org/officeDocument/2006/relationships" xmlns:p="http://schemas.openxmlformats.org/presentationml/2006/main">
   <p:cSld>
     <p:spTree>
@@ -6127,8 +7811,8 @@
         </p:nvSpPr>
         <p:spPr>
           <a:xfrm>
-            <a:off x="609600" y="764373"/>
-            <a:ext cx="7940040" cy="1293028"/>
+            <a:off x="2171700" y="228600"/>
+            <a:ext cx="6377940" cy="1293028"/>
           </a:xfrm>
         </p:spPr>
         <p:txBody>
@@ -6137,203 +7821,18 @@
           <a:p>
             <a:r>
               <a:rPr lang="en-US" dirty="0" smtClean="0"/>
-              <a:t>Sequence Diagrams – Cont.</a:t>
-            </a:r>
-            <a:endParaRPr lang="en-US" dirty="0"/>
-          </a:p>
-        </p:txBody>
-      </p:sp>
-      <p:sp>
-        <p:nvSpPr>
-          <p:cNvPr id="4" name="Rectangle 2"/>
-          <p:cNvSpPr>
-            <a:spLocks noChangeArrowheads="1"/>
-          </p:cNvSpPr>
-          <p:nvPr/>
-        </p:nvSpPr>
-        <p:spPr bwMode="auto">
-          <a:xfrm>
-            <a:off x="0" y="0"/>
-            <a:ext cx="9144000" cy="0"/>
-          </a:xfrm>
-          <a:prstGeom prst="rect">
-            <a:avLst/>
-          </a:prstGeom>
-          <a:noFill/>
-          <a:ln>
-            <a:noFill/>
-          </a:ln>
-          <a:effectLst/>
-          <a:extLst>
-            <a:ext uri="{909E8E84-426E-40DD-AFC4-6F175D3DCCD1}">
-              <a14:hiddenFill xmlns:a14="http://schemas.microsoft.com/office/drawing/2010/main">
-                <a:solidFill>
-                  <a:schemeClr val="accent1"/>
-                </a:solidFill>
-              </a14:hiddenFill>
-            </a:ext>
-            <a:ext uri="{91240B29-F687-4F45-9708-019B960494DF}">
-              <a14:hiddenLine xmlns:a14="http://schemas.microsoft.com/office/drawing/2010/main" w="9525">
-                <a:solidFill>
-                  <a:schemeClr val="tx1"/>
-                </a:solidFill>
-                <a:miter lim="800000"/>
-                <a:headEnd/>
-                <a:tailEnd/>
-              </a14:hiddenLine>
-            </a:ext>
-            <a:ext uri="{AF507438-7753-43E0-B8FC-AC1667EBCBE1}">
-              <a14:hiddenEffects xmlns:a14="http://schemas.microsoft.com/office/drawing/2010/main">
-                <a:effectLst>
-                  <a:outerShdw dist="35921" dir="2700000" algn="ctr" rotWithShape="0">
-                    <a:schemeClr val="bg2"/>
-                  </a:outerShdw>
-                </a:effectLst>
-              </a14:hiddenEffects>
-            </a:ext>
-          </a:extLst>
-        </p:spPr>
-        <p:txBody>
-          <a:bodyPr vert="horz" wrap="none" lIns="91440" tIns="45720" rIns="91440" bIns="45720" numCol="1" anchor="ctr" anchorCtr="0" compatLnSpc="1">
-            <a:prstTxWarp prst="textNoShape">
-              <a:avLst/>
-            </a:prstTxWarp>
-            <a:spAutoFit/>
-          </a:bodyPr>
-          <a:lstStyle/>
-          <a:p>
-            <a:endParaRPr lang="en-US"/>
-          </a:p>
-        </p:txBody>
-      </p:sp>
-      <p:graphicFrame>
-        <p:nvGraphicFramePr>
-          <p:cNvPr id="5" name="Object 4"/>
-          <p:cNvGraphicFramePr>
-            <a:graphicFrameLocks noChangeAspect="1"/>
-          </p:cNvGraphicFramePr>
-          <p:nvPr>
-            <p:extLst>
-              <p:ext uri="{D42A27DB-BD31-4B8C-83A1-F6EECF244321}">
-                <p14:modId xmlns:p14="http://schemas.microsoft.com/office/powerpoint/2010/main" val="3394196421"/>
-              </p:ext>
-            </p:extLst>
-          </p:nvPr>
-        </p:nvGraphicFramePr>
-        <p:xfrm>
-          <a:off x="1295400" y="1955800"/>
-          <a:ext cx="6781800" cy="4521200"/>
-        </p:xfrm>
-        <a:graphic>
-          <a:graphicData uri="http://schemas.openxmlformats.org/presentationml/2006/ole">
-            <mc:AlternateContent xmlns:mc="http://schemas.openxmlformats.org/markup-compatibility/2006">
-              <mc:Choice xmlns:v="urn:schemas-microsoft-com:vml" Requires="v">
-                <p:oleObj spid="_x0000_s6152" r:id="rId4" imgW="6991311" imgH="4667220" progId="Visio.Drawing.15">
-                  <p:embed/>
-                </p:oleObj>
-              </mc:Choice>
-              <mc:Fallback>
-                <p:oleObj r:id="rId4" imgW="6991311" imgH="4667220" progId="Visio.Drawing.15">
-                  <p:embed/>
-                  <p:pic>
-                    <p:nvPicPr>
-                      <p:cNvPr id="0" name="Object 1"/>
-                      <p:cNvPicPr>
-                        <a:picLocks noChangeAspect="1" noChangeArrowheads="1"/>
-                      </p:cNvPicPr>
-                      <p:nvPr/>
-                    </p:nvPicPr>
-                    <p:blipFill>
-                      <a:blip r:embed="rId5">
-                        <a:extLst>
-                          <a:ext uri="{28A0092B-C50C-407E-A947-70E740481C1C}">
-                            <a14:useLocalDpi xmlns:a14="http://schemas.microsoft.com/office/drawing/2010/main" val="0"/>
-                          </a:ext>
-                        </a:extLst>
-                      </a:blip>
-                      <a:srcRect/>
-                      <a:stretch>
-                        <a:fillRect/>
-                      </a:stretch>
-                    </p:blipFill>
-                    <p:spPr bwMode="auto">
-                      <a:xfrm>
-                        <a:off x="1295400" y="1955800"/>
-                        <a:ext cx="6781800" cy="4521200"/>
-                      </a:xfrm>
-                      <a:prstGeom prst="rect">
-                        <a:avLst/>
-                      </a:prstGeom>
-                      <a:noFill/>
-                    </p:spPr>
-                  </p:pic>
-                </p:oleObj>
-              </mc:Fallback>
-            </mc:AlternateContent>
-          </a:graphicData>
-        </a:graphic>
-      </p:graphicFrame>
-    </p:spTree>
-    <p:extLst>
-      <p:ext uri="{BB962C8B-B14F-4D97-AF65-F5344CB8AC3E}">
-        <p14:creationId xmlns:p14="http://schemas.microsoft.com/office/powerpoint/2010/main" val="4212167653"/>
-      </p:ext>
-    </p:extLst>
-  </p:cSld>
-  <p:clrMapOvr>
-    <a:masterClrMapping/>
-  </p:clrMapOvr>
-</p:sld>
-</file>
-
-<file path=ppt/slides/slide13.xml><?xml version="1.0" encoding="utf-8"?>
-<p:sld xmlns:a="http://schemas.openxmlformats.org/drawingml/2006/main" xmlns:r="http://schemas.openxmlformats.org/officeDocument/2006/relationships" xmlns:p="http://schemas.openxmlformats.org/presentationml/2006/main">
-  <p:cSld>
-    <p:spTree>
-      <p:nvGrpSpPr>
-        <p:cNvPr id="1" name=""/>
-        <p:cNvGrpSpPr/>
-        <p:nvPr/>
-      </p:nvGrpSpPr>
-      <p:grpSpPr>
-        <a:xfrm>
-          <a:off x="0" y="0"/>
-          <a:ext cx="0" cy="0"/>
-          <a:chOff x="0" y="0"/>
-          <a:chExt cx="0" cy="0"/>
-        </a:xfrm>
-      </p:grpSpPr>
-      <p:sp>
-        <p:nvSpPr>
-          <p:cNvPr id="2" name="Title 1"/>
-          <p:cNvSpPr>
-            <a:spLocks noGrp="1"/>
-          </p:cNvSpPr>
-          <p:nvPr>
-            <p:ph type="title"/>
-          </p:nvPr>
-        </p:nvSpPr>
-        <p:spPr>
-          <a:xfrm>
-            <a:off x="457200" y="764373"/>
-            <a:ext cx="8092440" cy="1293028"/>
-          </a:xfrm>
-        </p:spPr>
-        <p:txBody>
-          <a:bodyPr/>
-          <a:lstStyle/>
-          <a:p>
-            <a:r>
-              <a:rPr lang="en-US" dirty="0" smtClean="0"/>
-              <a:t>Development Environment</a:t>
-            </a:r>
-            <a:endParaRPr lang="en-US" dirty="0"/>
+              <a:t>Use Cases – cont</a:t>
+            </a:r>
+            <a:r>
+              <a:rPr lang="en-US" dirty="0"/>
+              <a:t>.</a:t>
+            </a:r>
           </a:p>
         </p:txBody>
       </p:sp>
       <p:pic>
         <p:nvPicPr>
-          <p:cNvPr id="7178" name="Picture 10" descr="https://pbs.twimg.com/profile_images/552902707300675584/_zzPQBoj.png"/>
+          <p:cNvPr id="7170" name="Picture 2"/>
           <p:cNvPicPr>
             <a:picLocks noChangeAspect="1" noChangeArrowheads="1"/>
           </p:cNvPicPr>
@@ -6354,452 +7853,8 @@
         </p:blipFill>
         <p:spPr bwMode="auto">
           <a:xfrm>
-            <a:off x="3312795" y="1735455"/>
-            <a:ext cx="2381250" cy="2381250"/>
-          </a:xfrm>
-          <a:prstGeom prst="rect">
-            <a:avLst/>
-          </a:prstGeom>
-          <a:noFill/>
-          <a:extLst>
-            <a:ext uri="{909E8E84-426E-40DD-AFC4-6F175D3DCCD1}">
-              <a14:hiddenFill xmlns:a14="http://schemas.microsoft.com/office/drawing/2010/main">
-                <a:solidFill>
-                  <a:srgbClr val="FFFFFF"/>
-                </a:solidFill>
-              </a14:hiddenFill>
-            </a:ext>
-          </a:extLst>
-        </p:spPr>
-      </p:pic>
-      <p:pic>
-        <p:nvPicPr>
-          <p:cNvPr id="7182" name="Picture 14" descr="Image result for github"/>
-          <p:cNvPicPr>
-            <a:picLocks noChangeAspect="1" noChangeArrowheads="1"/>
-          </p:cNvPicPr>
-          <p:nvPr/>
-        </p:nvPicPr>
-        <p:blipFill>
-          <a:blip r:embed="rId3">
-            <a:extLst>
-              <a:ext uri="{28A0092B-C50C-407E-A947-70E740481C1C}">
-                <a14:useLocalDpi xmlns:a14="http://schemas.microsoft.com/office/drawing/2010/main" val="0"/>
-              </a:ext>
-            </a:extLst>
-          </a:blip>
-          <a:srcRect/>
-          <a:stretch>
-            <a:fillRect/>
-          </a:stretch>
-        </p:blipFill>
-        <p:spPr bwMode="auto">
-          <a:xfrm>
-            <a:off x="6702743" y="1733550"/>
-            <a:ext cx="2381250" cy="2381250"/>
-          </a:xfrm>
-          <a:prstGeom prst="rect">
-            <a:avLst/>
-          </a:prstGeom>
-          <a:noFill/>
-          <a:extLst>
-            <a:ext uri="{909E8E84-426E-40DD-AFC4-6F175D3DCCD1}">
-              <a14:hiddenFill xmlns:a14="http://schemas.microsoft.com/office/drawing/2010/main">
-                <a:solidFill>
-                  <a:srgbClr val="FFFFFF"/>
-                </a:solidFill>
-              </a14:hiddenFill>
-            </a:ext>
-          </a:extLst>
-        </p:spPr>
-      </p:pic>
-      <p:pic>
-        <p:nvPicPr>
-          <p:cNvPr id="7184" name="Picture 16" descr="Image result for unity"/>
-          <p:cNvPicPr>
-            <a:picLocks noChangeAspect="1" noChangeArrowheads="1"/>
-          </p:cNvPicPr>
-          <p:nvPr/>
-        </p:nvPicPr>
-        <p:blipFill>
-          <a:blip r:embed="rId4">
-            <a:extLst>
-              <a:ext uri="{28A0092B-C50C-407E-A947-70E740481C1C}">
-                <a14:useLocalDpi xmlns:a14="http://schemas.microsoft.com/office/drawing/2010/main" val="0"/>
-              </a:ext>
-            </a:extLst>
-          </a:blip>
-          <a:srcRect/>
-          <a:stretch>
-            <a:fillRect/>
-          </a:stretch>
-        </p:blipFill>
-        <p:spPr bwMode="auto">
-          <a:xfrm>
-            <a:off x="180023" y="1733550"/>
-            <a:ext cx="2381250" cy="2381250"/>
-          </a:xfrm>
-          <a:prstGeom prst="rect">
-            <a:avLst/>
-          </a:prstGeom>
-          <a:noFill/>
-          <a:extLst>
-            <a:ext uri="{909E8E84-426E-40DD-AFC4-6F175D3DCCD1}">
-              <a14:hiddenFill xmlns:a14="http://schemas.microsoft.com/office/drawing/2010/main">
-                <a:solidFill>
-                  <a:srgbClr val="FFFFFF"/>
-                </a:solidFill>
-              </a14:hiddenFill>
-            </a:ext>
-          </a:extLst>
-        </p:spPr>
-      </p:pic>
-      <p:pic>
-        <p:nvPicPr>
-          <p:cNvPr id="7186" name="Picture 18" descr="Image result for google cardboard"/>
-          <p:cNvPicPr>
-            <a:picLocks noChangeAspect="1" noChangeArrowheads="1"/>
-          </p:cNvPicPr>
-          <p:nvPr/>
-        </p:nvPicPr>
-        <p:blipFill>
-          <a:blip r:embed="rId5">
-            <a:extLst>
-              <a:ext uri="{28A0092B-C50C-407E-A947-70E740481C1C}">
-                <a14:useLocalDpi xmlns:a14="http://schemas.microsoft.com/office/drawing/2010/main" val="0"/>
-              </a:ext>
-            </a:extLst>
-          </a:blip>
-          <a:srcRect/>
-          <a:stretch>
-            <a:fillRect/>
-          </a:stretch>
-        </p:blipFill>
-        <p:spPr bwMode="auto">
-          <a:xfrm>
-            <a:off x="1370648" y="4114800"/>
-            <a:ext cx="2381250" cy="2381250"/>
-          </a:xfrm>
-          <a:prstGeom prst="rect">
-            <a:avLst/>
-          </a:prstGeom>
-          <a:noFill/>
-          <a:extLst>
-            <a:ext uri="{909E8E84-426E-40DD-AFC4-6F175D3DCCD1}">
-              <a14:hiddenFill xmlns:a14="http://schemas.microsoft.com/office/drawing/2010/main">
-                <a:solidFill>
-                  <a:srgbClr val="FFFFFF"/>
-                </a:solidFill>
-              </a14:hiddenFill>
-            </a:ext>
-          </a:extLst>
-        </p:spPr>
-      </p:pic>
-      <p:pic>
-        <p:nvPicPr>
-          <p:cNvPr id="7188" name="Picture 20" descr="Image result for android"/>
-          <p:cNvPicPr>
-            <a:picLocks noChangeAspect="1" noChangeArrowheads="1"/>
-          </p:cNvPicPr>
-          <p:nvPr/>
-        </p:nvPicPr>
-        <p:blipFill>
-          <a:blip r:embed="rId6">
-            <a:extLst>
-              <a:ext uri="{28A0092B-C50C-407E-A947-70E740481C1C}">
-                <a14:useLocalDpi xmlns:a14="http://schemas.microsoft.com/office/drawing/2010/main" val="0"/>
-              </a:ext>
-            </a:extLst>
-          </a:blip>
-          <a:srcRect/>
-          <a:stretch>
-            <a:fillRect/>
-          </a:stretch>
-        </p:blipFill>
-        <p:spPr bwMode="auto">
-          <a:xfrm>
-            <a:off x="5233171" y="4113848"/>
-            <a:ext cx="2381250" cy="2381250"/>
-          </a:xfrm>
-          <a:prstGeom prst="rect">
-            <a:avLst/>
-          </a:prstGeom>
-          <a:noFill/>
-          <a:extLst>
-            <a:ext uri="{909E8E84-426E-40DD-AFC4-6F175D3DCCD1}">
-              <a14:hiddenFill xmlns:a14="http://schemas.microsoft.com/office/drawing/2010/main">
-                <a:solidFill>
-                  <a:srgbClr val="FFFFFF"/>
-                </a:solidFill>
-              </a14:hiddenFill>
-            </a:ext>
-          </a:extLst>
-        </p:spPr>
-      </p:pic>
-    </p:spTree>
-    <p:extLst>
-      <p:ext uri="{BB962C8B-B14F-4D97-AF65-F5344CB8AC3E}">
-        <p14:creationId xmlns:p14="http://schemas.microsoft.com/office/powerpoint/2010/main" val="1204134341"/>
-      </p:ext>
-    </p:extLst>
-  </p:cSld>
-  <p:clrMapOvr>
-    <a:masterClrMapping/>
-  </p:clrMapOvr>
-</p:sld>
-</file>
-
-<file path=ppt/slides/slide2.xml><?xml version="1.0" encoding="utf-8"?>
-<p:sld xmlns:a="http://schemas.openxmlformats.org/drawingml/2006/main" xmlns:r="http://schemas.openxmlformats.org/officeDocument/2006/relationships" xmlns:p="http://schemas.openxmlformats.org/presentationml/2006/main">
-  <p:cSld>
-    <p:spTree>
-      <p:nvGrpSpPr>
-        <p:cNvPr id="1" name=""/>
-        <p:cNvGrpSpPr/>
-        <p:nvPr/>
-      </p:nvGrpSpPr>
-      <p:grpSpPr>
-        <a:xfrm>
-          <a:off x="0" y="0"/>
-          <a:ext cx="0" cy="0"/>
-          <a:chOff x="0" y="0"/>
-          <a:chExt cx="0" cy="0"/>
-        </a:xfrm>
-      </p:grpSpPr>
-      <p:sp>
-        <p:nvSpPr>
-          <p:cNvPr id="2" name="Title 1"/>
-          <p:cNvSpPr>
-            <a:spLocks noGrp="1"/>
-          </p:cNvSpPr>
-          <p:nvPr>
-            <p:ph type="title"/>
-          </p:nvPr>
-        </p:nvSpPr>
-        <p:spPr/>
-        <p:txBody>
-          <a:bodyPr/>
-          <a:lstStyle/>
-          <a:p>
-            <a:r>
-              <a:rPr lang="en-US" dirty="0" smtClean="0"/>
-              <a:t>Project Overview</a:t>
-            </a:r>
-            <a:endParaRPr lang="en-US" dirty="0"/>
-          </a:p>
-        </p:txBody>
-      </p:sp>
-      <p:sp>
-        <p:nvSpPr>
-          <p:cNvPr id="3" name="Content Placeholder 2"/>
-          <p:cNvSpPr>
-            <a:spLocks noGrp="1"/>
-          </p:cNvSpPr>
-          <p:nvPr>
-            <p:ph idx="1"/>
-          </p:nvPr>
-        </p:nvSpPr>
-        <p:spPr/>
-        <p:txBody>
-          <a:bodyPr>
-            <a:normAutofit/>
-          </a:bodyPr>
-          <a:lstStyle/>
-          <a:p>
-            <a:r>
-              <a:rPr lang="en-US" sz="3600" dirty="0" smtClean="0"/>
-              <a:t>Android app designed for agents to demonstrate the dangers of distracted driving to policy holders </a:t>
-            </a:r>
-          </a:p>
-          <a:p>
-            <a:r>
-              <a:rPr lang="en-US" sz="3600" dirty="0" smtClean="0"/>
-              <a:t>Utilizes Google Cardboard VR to create an immersive experience to engage younger audiences</a:t>
-            </a:r>
-            <a:endParaRPr lang="en-US" sz="3600" dirty="0"/>
-          </a:p>
-        </p:txBody>
-      </p:sp>
-    </p:spTree>
-    <p:extLst>
-      <p:ext uri="{BB962C8B-B14F-4D97-AF65-F5344CB8AC3E}">
-        <p14:creationId xmlns:p14="http://schemas.microsoft.com/office/powerpoint/2010/main" val="2747763330"/>
-      </p:ext>
-    </p:extLst>
-  </p:cSld>
-  <p:clrMapOvr>
-    <a:masterClrMapping/>
-  </p:clrMapOvr>
-</p:sld>
-</file>
-
-<file path=ppt/slides/slide3.xml><?xml version="1.0" encoding="utf-8"?>
-<p:sld xmlns:a="http://schemas.openxmlformats.org/drawingml/2006/main" xmlns:r="http://schemas.openxmlformats.org/officeDocument/2006/relationships" xmlns:p="http://schemas.openxmlformats.org/presentationml/2006/main">
-  <p:cSld>
-    <p:spTree>
-      <p:nvGrpSpPr>
-        <p:cNvPr id="1" name=""/>
-        <p:cNvGrpSpPr/>
-        <p:nvPr/>
-      </p:nvGrpSpPr>
-      <p:grpSpPr>
-        <a:xfrm>
-          <a:off x="0" y="0"/>
-          <a:ext cx="0" cy="0"/>
-          <a:chOff x="0" y="0"/>
-          <a:chExt cx="0" cy="0"/>
-        </a:xfrm>
-      </p:grpSpPr>
-      <p:sp>
-        <p:nvSpPr>
-          <p:cNvPr id="2" name="Title 1"/>
-          <p:cNvSpPr>
-            <a:spLocks noGrp="1"/>
-          </p:cNvSpPr>
-          <p:nvPr>
-            <p:ph type="title"/>
-          </p:nvPr>
-        </p:nvSpPr>
-        <p:spPr/>
-        <p:txBody>
-          <a:bodyPr/>
-          <a:lstStyle/>
-          <a:p>
-            <a:r>
-              <a:rPr lang="en-US" dirty="0" smtClean="0"/>
-              <a:t>Business Problem</a:t>
-            </a:r>
-            <a:endParaRPr lang="en-US" dirty="0"/>
-          </a:p>
-        </p:txBody>
-      </p:sp>
-      <p:sp>
-        <p:nvSpPr>
-          <p:cNvPr id="3" name="Content Placeholder 2"/>
-          <p:cNvSpPr>
-            <a:spLocks noGrp="1"/>
-          </p:cNvSpPr>
-          <p:nvPr>
-            <p:ph idx="1"/>
-          </p:nvPr>
-        </p:nvSpPr>
-        <p:spPr/>
-        <p:txBody>
-          <a:bodyPr>
-            <a:noAutofit/>
-          </a:bodyPr>
-          <a:lstStyle/>
-          <a:p>
-            <a:r>
-              <a:rPr lang="en-US" sz="2400" b="1" dirty="0" smtClean="0"/>
-              <a:t>Project Background:</a:t>
-            </a:r>
-            <a:r>
-              <a:rPr lang="en-US" sz="2400" dirty="0" smtClean="0"/>
-              <a:t> Distracted driving is becoming more prevalent with the rise of technology. Erie Insurance is invested in increasing awareness about this issue.</a:t>
-            </a:r>
-          </a:p>
-          <a:p>
-            <a:r>
-              <a:rPr lang="en-US" sz="2400" b="1" dirty="0" smtClean="0"/>
-              <a:t>Project Needs:</a:t>
-            </a:r>
-            <a:r>
-              <a:rPr lang="en-US" sz="2400" dirty="0" smtClean="0"/>
-              <a:t> Erie Insurance is looking for an innovative solution to engage younger audiences in learning about the dangers of distracted driving.</a:t>
-            </a:r>
-          </a:p>
-          <a:p>
-            <a:r>
-              <a:rPr lang="en-US" sz="2400" b="1" dirty="0" smtClean="0"/>
-              <a:t>Project Objective:</a:t>
-            </a:r>
-            <a:r>
-              <a:rPr lang="en-US" sz="2400" dirty="0" smtClean="0"/>
-              <a:t> This project aims to utilize virtual reality technology to create an immersive experience that involves users of all ages.</a:t>
-            </a:r>
-            <a:endParaRPr lang="en-US" sz="2400" b="1" dirty="0"/>
-          </a:p>
-        </p:txBody>
-      </p:sp>
-    </p:spTree>
-    <p:extLst>
-      <p:ext uri="{BB962C8B-B14F-4D97-AF65-F5344CB8AC3E}">
-        <p14:creationId xmlns:p14="http://schemas.microsoft.com/office/powerpoint/2010/main" val="2288543293"/>
-      </p:ext>
-    </p:extLst>
-  </p:cSld>
-  <p:clrMapOvr>
-    <a:masterClrMapping/>
-  </p:clrMapOvr>
-</p:sld>
-</file>
-
-<file path=ppt/slides/slide4.xml><?xml version="1.0" encoding="utf-8"?>
-<p:sld xmlns:a="http://schemas.openxmlformats.org/drawingml/2006/main" xmlns:r="http://schemas.openxmlformats.org/officeDocument/2006/relationships" xmlns:p="http://schemas.openxmlformats.org/presentationml/2006/main">
-  <p:cSld>
-    <p:spTree>
-      <p:nvGrpSpPr>
-        <p:cNvPr id="1" name=""/>
-        <p:cNvGrpSpPr/>
-        <p:nvPr/>
-      </p:nvGrpSpPr>
-      <p:grpSpPr>
-        <a:xfrm>
-          <a:off x="0" y="0"/>
-          <a:ext cx="0" cy="0"/>
-          <a:chOff x="0" y="0"/>
-          <a:chExt cx="0" cy="0"/>
-        </a:xfrm>
-      </p:grpSpPr>
-      <p:sp>
-        <p:nvSpPr>
-          <p:cNvPr id="2" name="Title 1"/>
-          <p:cNvSpPr>
-            <a:spLocks noGrp="1"/>
-          </p:cNvSpPr>
-          <p:nvPr>
-            <p:ph type="title"/>
-          </p:nvPr>
-        </p:nvSpPr>
-        <p:spPr/>
-        <p:txBody>
-          <a:bodyPr/>
-          <a:lstStyle/>
-          <a:p>
-            <a:r>
-              <a:rPr lang="en-US" dirty="0" smtClean="0"/>
-              <a:t>Requirements</a:t>
-            </a:r>
-            <a:endParaRPr lang="en-US" dirty="0"/>
-          </a:p>
-        </p:txBody>
-      </p:sp>
-      <p:pic>
-        <p:nvPicPr>
-          <p:cNvPr id="1026" name="Picture 2"/>
-          <p:cNvPicPr>
-            <a:picLocks noChangeAspect="1" noChangeArrowheads="1"/>
-          </p:cNvPicPr>
-          <p:nvPr/>
-        </p:nvPicPr>
-        <p:blipFill>
-          <a:blip r:embed="rId2">
-            <a:extLst>
-              <a:ext uri="{28A0092B-C50C-407E-A947-70E740481C1C}">
-                <a14:useLocalDpi xmlns:a14="http://schemas.microsoft.com/office/drawing/2010/main" val="0"/>
-              </a:ext>
-            </a:extLst>
-          </a:blip>
-          <a:srcRect/>
-          <a:stretch>
-            <a:fillRect/>
-          </a:stretch>
-        </p:blipFill>
-        <p:spPr bwMode="auto">
-          <a:xfrm>
-            <a:off x="1228725" y="2228850"/>
-            <a:ext cx="6686550" cy="3790950"/>
+            <a:off x="1295400" y="1371600"/>
+            <a:ext cx="6638925" cy="4610100"/>
           </a:xfrm>
           <a:prstGeom prst="rect">
             <a:avLst/>
@@ -6829,589 +7884,40 @@
           </a:extLst>
         </p:spPr>
       </p:pic>
-    </p:spTree>
-    <p:extLst>
-      <p:ext uri="{BB962C8B-B14F-4D97-AF65-F5344CB8AC3E}">
-        <p14:creationId xmlns:p14="http://schemas.microsoft.com/office/powerpoint/2010/main" val="664915384"/>
-      </p:ext>
-    </p:extLst>
-  </p:cSld>
-  <p:clrMapOvr>
-    <a:masterClrMapping/>
-  </p:clrMapOvr>
-</p:sld>
-</file>
-
-<file path=ppt/slides/slide5.xml><?xml version="1.0" encoding="utf-8"?>
-<p:sld xmlns:a="http://schemas.openxmlformats.org/drawingml/2006/main" xmlns:r="http://schemas.openxmlformats.org/officeDocument/2006/relationships" xmlns:p="http://schemas.openxmlformats.org/presentationml/2006/main">
-  <p:cSld>
-    <p:spTree>
-      <p:nvGrpSpPr>
-        <p:cNvPr id="1" name=""/>
-        <p:cNvGrpSpPr/>
-        <p:nvPr/>
-      </p:nvGrpSpPr>
-      <p:grpSpPr>
-        <a:xfrm>
-          <a:off x="0" y="0"/>
-          <a:ext cx="0" cy="0"/>
-          <a:chOff x="0" y="0"/>
-          <a:chExt cx="0" cy="0"/>
-        </a:xfrm>
-      </p:grpSpPr>
-      <p:sp>
-        <p:nvSpPr>
-          <p:cNvPr id="2" name="Title 1"/>
-          <p:cNvSpPr>
-            <a:spLocks noGrp="1"/>
-          </p:cNvSpPr>
-          <p:nvPr>
-            <p:ph type="title"/>
-          </p:nvPr>
-        </p:nvSpPr>
-        <p:spPr/>
-        <p:txBody>
-          <a:bodyPr/>
-          <a:lstStyle/>
-          <a:p>
-            <a:r>
-              <a:rPr lang="en-US" dirty="0" smtClean="0"/>
-              <a:t>Requirements – Cont.</a:t>
-            </a:r>
-            <a:endParaRPr lang="en-US" dirty="0"/>
-          </a:p>
-        </p:txBody>
-      </p:sp>
-      <p:pic>
-        <p:nvPicPr>
-          <p:cNvPr id="2050" name="Picture 2"/>
-          <p:cNvPicPr>
-            <a:picLocks noChangeAspect="1" noChangeArrowheads="1"/>
-          </p:cNvPicPr>
+      <p:sp>
+        <p:nvSpPr>
+          <p:cNvPr id="4" name="TextBox 3"/>
+          <p:cNvSpPr txBox="1"/>
           <p:nvPr/>
-        </p:nvPicPr>
-        <p:blipFill>
-          <a:blip r:embed="rId2">
-            <a:extLst>
-              <a:ext uri="{28A0092B-C50C-407E-A947-70E740481C1C}">
-                <a14:useLocalDpi xmlns:a14="http://schemas.microsoft.com/office/drawing/2010/main" val="0"/>
-              </a:ext>
-            </a:extLst>
-          </a:blip>
-          <a:srcRect/>
-          <a:stretch>
-            <a:fillRect/>
-          </a:stretch>
-        </p:blipFill>
-        <p:spPr bwMode="auto">
-          <a:xfrm>
-            <a:off x="1233488" y="2228850"/>
-            <a:ext cx="6677025" cy="2400300"/>
+        </p:nvSpPr>
+        <p:spPr>
+          <a:xfrm>
+            <a:off x="1219200" y="6248400"/>
+            <a:ext cx="7315200" cy="415498"/>
           </a:xfrm>
           <a:prstGeom prst="rect">
             <a:avLst/>
           </a:prstGeom>
           <a:noFill/>
-          <a:ln>
-            <a:noFill/>
-          </a:ln>
-          <a:extLst>
-            <a:ext uri="{909E8E84-426E-40DD-AFC4-6F175D3DCCD1}">
-              <a14:hiddenFill xmlns:a14="http://schemas.microsoft.com/office/drawing/2010/main">
-                <a:solidFill>
-                  <a:schemeClr val="accent1"/>
-                </a:solidFill>
-              </a14:hiddenFill>
-            </a:ext>
-            <a:ext uri="{91240B29-F687-4F45-9708-019B960494DF}">
-              <a14:hiddenLine xmlns:a14="http://schemas.microsoft.com/office/drawing/2010/main" w="9525">
-                <a:solidFill>
-                  <a:schemeClr val="tx1"/>
-                </a:solidFill>
-                <a:miter lim="800000"/>
-                <a:headEnd/>
-                <a:tailEnd/>
-              </a14:hiddenLine>
-            </a:ext>
-          </a:extLst>
-        </p:spPr>
-      </p:pic>
-    </p:spTree>
-    <p:extLst>
-      <p:ext uri="{BB962C8B-B14F-4D97-AF65-F5344CB8AC3E}">
-        <p14:creationId xmlns:p14="http://schemas.microsoft.com/office/powerpoint/2010/main" val="1865500975"/>
-      </p:ext>
-    </p:extLst>
-  </p:cSld>
-  <p:clrMapOvr>
-    <a:masterClrMapping/>
-  </p:clrMapOvr>
-</p:sld>
-</file>
-
-<file path=ppt/slides/slide6.xml><?xml version="1.0" encoding="utf-8"?>
-<p:sld xmlns:a="http://schemas.openxmlformats.org/drawingml/2006/main" xmlns:r="http://schemas.openxmlformats.org/officeDocument/2006/relationships" xmlns:p="http://schemas.openxmlformats.org/presentationml/2006/main">
-  <p:cSld>
-    <p:spTree>
-      <p:nvGrpSpPr>
-        <p:cNvPr id="1" name=""/>
-        <p:cNvGrpSpPr/>
-        <p:nvPr/>
-      </p:nvGrpSpPr>
-      <p:grpSpPr>
-        <a:xfrm>
-          <a:off x="0" y="0"/>
-          <a:ext cx="0" cy="0"/>
-          <a:chOff x="0" y="0"/>
-          <a:chExt cx="0" cy="0"/>
-        </a:xfrm>
-      </p:grpSpPr>
-      <p:sp>
-        <p:nvSpPr>
-          <p:cNvPr id="2" name="Title 1"/>
-          <p:cNvSpPr>
-            <a:spLocks noGrp="1"/>
-          </p:cNvSpPr>
-          <p:nvPr>
-            <p:ph type="title"/>
-          </p:nvPr>
-        </p:nvSpPr>
-        <p:spPr/>
-        <p:txBody>
-          <a:bodyPr/>
-          <a:lstStyle/>
-          <a:p>
-            <a:r>
-              <a:rPr lang="en-US" dirty="0" smtClean="0"/>
-              <a:t>Requirements – Cont.</a:t>
-            </a:r>
-            <a:endParaRPr lang="en-US" dirty="0"/>
-          </a:p>
-        </p:txBody>
-      </p:sp>
-      <p:pic>
-        <p:nvPicPr>
-          <p:cNvPr id="3074" name="Picture 2"/>
-          <p:cNvPicPr>
-            <a:picLocks noChangeAspect="1" noChangeArrowheads="1"/>
-          </p:cNvPicPr>
-          <p:nvPr/>
-        </p:nvPicPr>
-        <p:blipFill>
-          <a:blip r:embed="rId2">
-            <a:extLst>
-              <a:ext uri="{28A0092B-C50C-407E-A947-70E740481C1C}">
-                <a14:useLocalDpi xmlns:a14="http://schemas.microsoft.com/office/drawing/2010/main" val="0"/>
-              </a:ext>
-            </a:extLst>
-          </a:blip>
-          <a:srcRect/>
-          <a:stretch>
-            <a:fillRect/>
-          </a:stretch>
-        </p:blipFill>
-        <p:spPr bwMode="auto">
-          <a:xfrm>
-            <a:off x="1233488" y="2209800"/>
-            <a:ext cx="6677025" cy="1819275"/>
-          </a:xfrm>
-          <a:prstGeom prst="rect">
-            <a:avLst/>
-          </a:prstGeom>
-          <a:noFill/>
-          <a:ln>
-            <a:noFill/>
-          </a:ln>
-          <a:extLst>
-            <a:ext uri="{909E8E84-426E-40DD-AFC4-6F175D3DCCD1}">
-              <a14:hiddenFill xmlns:a14="http://schemas.microsoft.com/office/drawing/2010/main">
-                <a:solidFill>
-                  <a:schemeClr val="accent1"/>
-                </a:solidFill>
-              </a14:hiddenFill>
-            </a:ext>
-            <a:ext uri="{91240B29-F687-4F45-9708-019B960494DF}">
-              <a14:hiddenLine xmlns:a14="http://schemas.microsoft.com/office/drawing/2010/main" w="9525">
-                <a:solidFill>
-                  <a:schemeClr val="tx1"/>
-                </a:solidFill>
-                <a:miter lim="800000"/>
-                <a:headEnd/>
-                <a:tailEnd/>
-              </a14:hiddenLine>
-            </a:ext>
-          </a:extLst>
-        </p:spPr>
-      </p:pic>
-    </p:spTree>
-    <p:extLst>
-      <p:ext uri="{BB962C8B-B14F-4D97-AF65-F5344CB8AC3E}">
-        <p14:creationId xmlns:p14="http://schemas.microsoft.com/office/powerpoint/2010/main" val="1693246604"/>
-      </p:ext>
-    </p:extLst>
-  </p:cSld>
-  <p:clrMapOvr>
-    <a:masterClrMapping/>
-  </p:clrMapOvr>
-</p:sld>
-</file>
-
-<file path=ppt/slides/slide7.xml><?xml version="1.0" encoding="utf-8"?>
-<p:sld xmlns:a="http://schemas.openxmlformats.org/drawingml/2006/main" xmlns:r="http://schemas.openxmlformats.org/officeDocument/2006/relationships" xmlns:p="http://schemas.openxmlformats.org/presentationml/2006/main">
-  <p:cSld>
-    <p:spTree>
-      <p:nvGrpSpPr>
-        <p:cNvPr id="1" name=""/>
-        <p:cNvGrpSpPr/>
-        <p:nvPr/>
-      </p:nvGrpSpPr>
-      <p:grpSpPr>
-        <a:xfrm>
-          <a:off x="0" y="0"/>
-          <a:ext cx="0" cy="0"/>
-          <a:chOff x="0" y="0"/>
-          <a:chExt cx="0" cy="0"/>
-        </a:xfrm>
-      </p:grpSpPr>
-      <p:sp>
-        <p:nvSpPr>
-          <p:cNvPr id="2" name="Title 1"/>
-          <p:cNvSpPr>
-            <a:spLocks noGrp="1"/>
-          </p:cNvSpPr>
-          <p:nvPr>
-            <p:ph type="title"/>
-          </p:nvPr>
-        </p:nvSpPr>
-        <p:spPr/>
-        <p:txBody>
-          <a:bodyPr/>
-          <a:lstStyle/>
-          <a:p>
-            <a:r>
-              <a:rPr lang="en-US" dirty="0" smtClean="0"/>
-              <a:t>Use Case Diagram</a:t>
-            </a:r>
-            <a:endParaRPr lang="en-US" dirty="0"/>
-          </a:p>
-        </p:txBody>
-      </p:sp>
-      <p:sp>
-        <p:nvSpPr>
-          <p:cNvPr id="4" name="Rectangle 2"/>
-          <p:cNvSpPr>
-            <a:spLocks noChangeArrowheads="1"/>
-          </p:cNvSpPr>
-          <p:nvPr/>
-        </p:nvSpPr>
-        <p:spPr bwMode="auto">
-          <a:xfrm>
-            <a:off x="0" y="0"/>
-            <a:ext cx="9144000" cy="0"/>
-          </a:xfrm>
-          <a:prstGeom prst="rect">
-            <a:avLst/>
-          </a:prstGeom>
-          <a:noFill/>
-          <a:ln>
-            <a:noFill/>
-          </a:ln>
-          <a:effectLst/>
-          <a:extLst>
-            <a:ext uri="{909E8E84-426E-40DD-AFC4-6F175D3DCCD1}">
-              <a14:hiddenFill xmlns:a14="http://schemas.microsoft.com/office/drawing/2010/main">
-                <a:solidFill>
-                  <a:schemeClr val="accent1"/>
-                </a:solidFill>
-              </a14:hiddenFill>
-            </a:ext>
-            <a:ext uri="{91240B29-F687-4F45-9708-019B960494DF}">
-              <a14:hiddenLine xmlns:a14="http://schemas.microsoft.com/office/drawing/2010/main" w="9525">
-                <a:solidFill>
-                  <a:schemeClr val="tx1"/>
-                </a:solidFill>
-                <a:miter lim="800000"/>
-                <a:headEnd/>
-                <a:tailEnd/>
-              </a14:hiddenLine>
-            </a:ext>
-            <a:ext uri="{AF507438-7753-43E0-B8FC-AC1667EBCBE1}">
-              <a14:hiddenEffects xmlns:a14="http://schemas.microsoft.com/office/drawing/2010/main">
-                <a:effectLst>
-                  <a:outerShdw dist="35921" dir="2700000" algn="ctr" rotWithShape="0">
-                    <a:schemeClr val="bg2"/>
-                  </a:outerShdw>
-                </a:effectLst>
-              </a14:hiddenEffects>
-            </a:ext>
-          </a:extLst>
-        </p:spPr>
-        <p:txBody>
-          <a:bodyPr vert="horz" wrap="none" lIns="91440" tIns="45720" rIns="91440" bIns="45720" numCol="1" anchor="ctr" anchorCtr="0" compatLnSpc="1">
-            <a:prstTxWarp prst="textNoShape">
-              <a:avLst/>
-            </a:prstTxWarp>
+        </p:spPr>
+        <p:txBody>
+          <a:bodyPr wrap="square" rtlCol="0">
             <a:spAutoFit/>
           </a:bodyPr>
           <a:lstStyle/>
           <a:p>
-            <a:endParaRPr lang="en-US"/>
-          </a:p>
-        </p:txBody>
-      </p:sp>
-      <p:graphicFrame>
-        <p:nvGraphicFramePr>
-          <p:cNvPr id="5" name="Object 4"/>
-          <p:cNvGraphicFramePr>
-            <a:graphicFrameLocks noChangeAspect="1"/>
-          </p:cNvGraphicFramePr>
-          <p:nvPr>
-            <p:extLst>
-              <p:ext uri="{D42A27DB-BD31-4B8C-83A1-F6EECF244321}">
-                <p14:modId xmlns:p14="http://schemas.microsoft.com/office/powerpoint/2010/main" val="2401830687"/>
-              </p:ext>
-            </p:extLst>
-          </p:nvPr>
-        </p:nvGraphicFramePr>
-        <p:xfrm>
-          <a:off x="1752600" y="2133600"/>
-          <a:ext cx="6032648" cy="2914650"/>
-        </p:xfrm>
-        <a:graphic>
-          <a:graphicData uri="http://schemas.openxmlformats.org/presentationml/2006/ole">
-            <mc:AlternateContent xmlns:mc="http://schemas.openxmlformats.org/markup-compatibility/2006">
-              <mc:Choice xmlns:v="urn:schemas-microsoft-com:vml" Requires="v">
-                <p:oleObj spid="_x0000_s4104" r:id="rId4" imgW="5086333" imgH="2457540" progId="Visio.Drawing.15">
-                  <p:embed/>
-                </p:oleObj>
-              </mc:Choice>
-              <mc:Fallback>
-                <p:oleObj r:id="rId4" imgW="5086333" imgH="2457540" progId="Visio.Drawing.15">
-                  <p:embed/>
-                  <p:pic>
-                    <p:nvPicPr>
-                      <p:cNvPr id="0" name="Object 1"/>
-                      <p:cNvPicPr>
-                        <a:picLocks noChangeAspect="1" noChangeArrowheads="1"/>
-                      </p:cNvPicPr>
-                      <p:nvPr/>
-                    </p:nvPicPr>
-                    <p:blipFill>
-                      <a:blip r:embed="rId5">
-                        <a:extLst>
-                          <a:ext uri="{28A0092B-C50C-407E-A947-70E740481C1C}">
-                            <a14:useLocalDpi xmlns:a14="http://schemas.microsoft.com/office/drawing/2010/main" val="0"/>
-                          </a:ext>
-                        </a:extLst>
-                      </a:blip>
-                      <a:srcRect/>
-                      <a:stretch>
-                        <a:fillRect/>
-                      </a:stretch>
-                    </p:blipFill>
-                    <p:spPr bwMode="auto">
-                      <a:xfrm>
-                        <a:off x="1752600" y="2133600"/>
-                        <a:ext cx="6032648" cy="2914650"/>
-                      </a:xfrm>
-                      <a:prstGeom prst="rect">
-                        <a:avLst/>
-                      </a:prstGeom>
-                      <a:noFill/>
-                    </p:spPr>
-                  </p:pic>
-                </p:oleObj>
-              </mc:Fallback>
-            </mc:AlternateContent>
-          </a:graphicData>
-        </a:graphic>
-      </p:graphicFrame>
-    </p:spTree>
-    <p:extLst>
-      <p:ext uri="{BB962C8B-B14F-4D97-AF65-F5344CB8AC3E}">
-        <p14:creationId xmlns:p14="http://schemas.microsoft.com/office/powerpoint/2010/main" val="549260242"/>
-      </p:ext>
-    </p:extLst>
-  </p:cSld>
-  <p:clrMapOvr>
-    <a:masterClrMapping/>
-  </p:clrMapOvr>
-</p:sld>
-</file>
-
-<file path=ppt/slides/slide8.xml><?xml version="1.0" encoding="utf-8"?>
-<p:sld xmlns:a="http://schemas.openxmlformats.org/drawingml/2006/main" xmlns:r="http://schemas.openxmlformats.org/officeDocument/2006/relationships" xmlns:p="http://schemas.openxmlformats.org/presentationml/2006/main">
-  <p:cSld>
-    <p:spTree>
-      <p:nvGrpSpPr>
-        <p:cNvPr id="1" name=""/>
-        <p:cNvGrpSpPr/>
-        <p:nvPr/>
-      </p:nvGrpSpPr>
-      <p:grpSpPr>
-        <a:xfrm>
-          <a:off x="0" y="0"/>
-          <a:ext cx="0" cy="0"/>
-          <a:chOff x="0" y="0"/>
-          <a:chExt cx="0" cy="0"/>
-        </a:xfrm>
-      </p:grpSpPr>
-      <p:sp>
-        <p:nvSpPr>
-          <p:cNvPr id="2" name="Title 1"/>
-          <p:cNvSpPr>
-            <a:spLocks noGrp="1"/>
-          </p:cNvSpPr>
-          <p:nvPr>
-            <p:ph type="title"/>
-          </p:nvPr>
-        </p:nvSpPr>
-        <p:spPr/>
-        <p:txBody>
-          <a:bodyPr/>
-          <a:lstStyle/>
-          <a:p>
-            <a:r>
-              <a:rPr lang="en-US" dirty="0" smtClean="0"/>
-              <a:t>Use Cases</a:t>
-            </a:r>
-            <a:endParaRPr lang="en-US" dirty="0"/>
-          </a:p>
-        </p:txBody>
-      </p:sp>
-      <p:pic>
-        <p:nvPicPr>
-          <p:cNvPr id="7170" name="Picture 2"/>
-          <p:cNvPicPr>
-            <a:picLocks noChangeAspect="1" noChangeArrowheads="1"/>
-          </p:cNvPicPr>
-          <p:nvPr/>
-        </p:nvPicPr>
-        <p:blipFill>
-          <a:blip r:embed="rId2">
-            <a:extLst>
-              <a:ext uri="{28A0092B-C50C-407E-A947-70E740481C1C}">
-                <a14:useLocalDpi xmlns:a14="http://schemas.microsoft.com/office/drawing/2010/main" val="0"/>
-              </a:ext>
-            </a:extLst>
-          </a:blip>
-          <a:srcRect/>
-          <a:stretch>
-            <a:fillRect/>
-          </a:stretch>
-        </p:blipFill>
-        <p:spPr bwMode="auto">
-          <a:xfrm>
-            <a:off x="1295400" y="1866900"/>
-            <a:ext cx="6638925" cy="4610100"/>
-          </a:xfrm>
-          <a:prstGeom prst="rect">
-            <a:avLst/>
-          </a:prstGeom>
-          <a:noFill/>
-          <a:ln>
-            <a:noFill/>
-          </a:ln>
-          <a:extLst>
-            <a:ext uri="{909E8E84-426E-40DD-AFC4-6F175D3DCCD1}">
-              <a14:hiddenFill xmlns:a14="http://schemas.microsoft.com/office/drawing/2010/main">
-                <a:solidFill>
-                  <a:schemeClr val="accent1"/>
-                </a:solidFill>
-              </a14:hiddenFill>
-            </a:ext>
-            <a:ext uri="{91240B29-F687-4F45-9708-019B960494DF}">
-              <a14:hiddenLine xmlns:a14="http://schemas.microsoft.com/office/drawing/2010/main" w="9525">
-                <a:solidFill>
-                  <a:schemeClr val="tx1"/>
-                </a:solidFill>
-                <a:miter lim="800000"/>
-                <a:headEnd/>
-                <a:tailEnd/>
-              </a14:hiddenLine>
-            </a:ext>
-          </a:extLst>
-        </p:spPr>
-      </p:pic>
+            <a:r>
+              <a:rPr lang="en-US" sz="1050" dirty="0" smtClean="0"/>
+              <a:t>Note: These are our initial set of use cases. We may add new use cases as we progress and current use cases may change in the future.</a:t>
+            </a:r>
+            <a:endParaRPr lang="en-US" sz="1050" dirty="0"/>
+          </a:p>
+        </p:txBody>
+      </p:sp>
     </p:spTree>
     <p:extLst>
       <p:ext uri="{BB962C8B-B14F-4D97-AF65-F5344CB8AC3E}">
         <p14:creationId xmlns:p14="http://schemas.microsoft.com/office/powerpoint/2010/main" val="3930391348"/>
-      </p:ext>
-    </p:extLst>
-  </p:cSld>
-  <p:clrMapOvr>
-    <a:masterClrMapping/>
-  </p:clrMapOvr>
-</p:sld>
-</file>
-
-<file path=ppt/slides/slide9.xml><?xml version="1.0" encoding="utf-8"?>
-<p:sld xmlns:a="http://schemas.openxmlformats.org/drawingml/2006/main" xmlns:r="http://schemas.openxmlformats.org/officeDocument/2006/relationships" xmlns:p="http://schemas.openxmlformats.org/presentationml/2006/main">
-  <p:cSld>
-    <p:spTree>
-      <p:nvGrpSpPr>
-        <p:cNvPr id="1" name=""/>
-        <p:cNvGrpSpPr/>
-        <p:nvPr/>
-      </p:nvGrpSpPr>
-      <p:grpSpPr>
-        <a:xfrm>
-          <a:off x="0" y="0"/>
-          <a:ext cx="0" cy="0"/>
-          <a:chOff x="0" y="0"/>
-          <a:chExt cx="0" cy="0"/>
-        </a:xfrm>
-      </p:grpSpPr>
-      <p:sp>
-        <p:nvSpPr>
-          <p:cNvPr id="2" name="Title 1"/>
-          <p:cNvSpPr>
-            <a:spLocks noGrp="1"/>
-          </p:cNvSpPr>
-          <p:nvPr>
-            <p:ph type="title"/>
-          </p:nvPr>
-        </p:nvSpPr>
-        <p:spPr/>
-        <p:txBody>
-          <a:bodyPr/>
-          <a:lstStyle/>
-          <a:p>
-            <a:r>
-              <a:rPr lang="en-US" dirty="0" smtClean="0"/>
-              <a:t>Use Cases – Cont.</a:t>
-            </a:r>
-            <a:endParaRPr lang="en-US" dirty="0"/>
-          </a:p>
-        </p:txBody>
-      </p:sp>
-      <p:pic>
-        <p:nvPicPr>
-          <p:cNvPr id="4" name="Picture 3"/>
-          <p:cNvPicPr/>
-          <p:nvPr/>
-        </p:nvPicPr>
-        <p:blipFill>
-          <a:blip r:embed="rId2"/>
-          <a:stretch>
-            <a:fillRect/>
-          </a:stretch>
-        </p:blipFill>
-        <p:spPr>
-          <a:xfrm>
-            <a:off x="1295400" y="1826260"/>
-            <a:ext cx="6629400" cy="4650740"/>
-          </a:xfrm>
-          <a:prstGeom prst="rect">
-            <a:avLst/>
-          </a:prstGeom>
-        </p:spPr>
-      </p:pic>
-    </p:spTree>
-    <p:extLst>
-      <p:ext uri="{BB962C8B-B14F-4D97-AF65-F5344CB8AC3E}">
-        <p14:creationId xmlns:p14="http://schemas.microsoft.com/office/powerpoint/2010/main" val="3424105124"/>
       </p:ext>
     </p:extLst>
   </p:cSld>

</xml_diff>